<commit_message>
add sys schdule rate slide
</commit_message>
<xml_diff>
--- a/ppt/2022-6-11.pptx
+++ b/ppt/2022-6-11.pptx
@@ -5,23 +5,24 @@
     <p:sldMasterId id="2147483648" r:id="rId1"/>
   </p:sldMasterIdLst>
   <p:notesMasterIdLst>
-    <p:notesMasterId r:id="rId4"/>
+    <p:notesMasterId r:id="rId17"/>
   </p:notesMasterIdLst>
   <p:sldIdLst>
-    <p:sldId id="279" r:id="rId3"/>
-    <p:sldId id="340" r:id="rId5"/>
-    <p:sldId id="419" r:id="rId6"/>
-    <p:sldId id="460" r:id="rId7"/>
-    <p:sldId id="461" r:id="rId8"/>
-    <p:sldId id="462" r:id="rId9"/>
-    <p:sldId id="449" r:id="rId10"/>
-    <p:sldId id="468" r:id="rId11"/>
-    <p:sldId id="469" r:id="rId12"/>
-    <p:sldId id="470" r:id="rId13"/>
-    <p:sldId id="471" r:id="rId14"/>
-    <p:sldId id="464" r:id="rId15"/>
-    <p:sldId id="465" r:id="rId16"/>
-    <p:sldId id="314" r:id="rId17"/>
+    <p:sldId id="279" r:id="rId2"/>
+    <p:sldId id="340" r:id="rId3"/>
+    <p:sldId id="419" r:id="rId4"/>
+    <p:sldId id="460" r:id="rId5"/>
+    <p:sldId id="461" r:id="rId6"/>
+    <p:sldId id="462" r:id="rId7"/>
+    <p:sldId id="449" r:id="rId8"/>
+    <p:sldId id="472" r:id="rId9"/>
+    <p:sldId id="468" r:id="rId10"/>
+    <p:sldId id="469" r:id="rId11"/>
+    <p:sldId id="470" r:id="rId12"/>
+    <p:sldId id="471" r:id="rId13"/>
+    <p:sldId id="464" r:id="rId14"/>
+    <p:sldId id="465" r:id="rId15"/>
+    <p:sldId id="314" r:id="rId16"/>
   </p:sldIdLst>
   <p:sldSz cx="12192000" cy="6858000"/>
   <p:notesSz cx="6858000" cy="9144000"/>
@@ -132,16 +133,36 @@
             <p14:sldId id="461"/>
             <p14:sldId id="462"/>
             <p14:sldId id="449"/>
+            <p14:sldId id="472"/>
+            <p14:sldId id="468"/>
             <p14:sldId id="469"/>
             <p14:sldId id="470"/>
             <p14:sldId id="471"/>
             <p14:sldId id="464"/>
             <p14:sldId id="465"/>
             <p14:sldId id="314"/>
-            <p14:sldId id="468"/>
           </p14:sldIdLst>
         </p14:section>
       </p14:sectionLst>
+    </p:ext>
+    <p:ext uri="{EFAFB233-063F-42B5-8137-9DF3F51BA10A}">
+      <p15:sldGuideLst xmlns:p15="http://schemas.microsoft.com/office/powerpoint/2012/main">
+        <p15:guide id="1" orient="horz" pos="1155">
+          <p15:clr>
+            <a:srgbClr val="A4A3A4"/>
+          </p15:clr>
+        </p15:guide>
+        <p15:guide id="2" pos="665">
+          <p15:clr>
+            <a:srgbClr val="A4A3A4"/>
+          </p15:clr>
+        </p15:guide>
+        <p15:guide id="3" pos="6978">
+          <p15:clr>
+            <a:srgbClr val="A4A3A4"/>
+          </p15:clr>
+        </p15:guide>
+      </p15:sldGuideLst>
     </p:ext>
   </p:extLst>
 </p:presentation>
@@ -235,6 +256,7 @@
           <a:p>
             <a:fld id="{DE75668F-B37B-164D-A62C-3FF5A8BC808F}" type="datetimeFigureOut">
               <a:rPr lang="en-US" smtClean="0"/>
+              <a:t>6/10/22</a:t>
             </a:fld>
             <a:endParaRPr lang="en-US"/>
           </a:p>
@@ -301,7 +323,6 @@
               <a:rPr lang="en-US" altLang="zh-CN"/>
               <a:t>Click to edit Master text styles</a:t>
             </a:r>
-            <a:endParaRPr lang="en-US" altLang="zh-CN"/>
           </a:p>
           <a:p>
             <a:pPr lvl="1"/>
@@ -309,7 +330,6 @@
               <a:rPr lang="en-US" altLang="zh-CN"/>
               <a:t>Second level</a:t>
             </a:r>
-            <a:endParaRPr lang="en-US" altLang="zh-CN"/>
           </a:p>
           <a:p>
             <a:pPr lvl="2"/>
@@ -317,7 +337,6 @@
               <a:rPr lang="en-US" altLang="zh-CN"/>
               <a:t>Third level</a:t>
             </a:r>
-            <a:endParaRPr lang="en-US" altLang="zh-CN"/>
           </a:p>
           <a:p>
             <a:pPr lvl="3"/>
@@ -325,7 +344,6 @@
               <a:rPr lang="en-US" altLang="zh-CN"/>
               <a:t>Fourth level</a:t>
             </a:r>
-            <a:endParaRPr lang="en-US" altLang="zh-CN"/>
           </a:p>
           <a:p>
             <a:pPr lvl="4"/>
@@ -397,6 +415,7 @@
           <a:p>
             <a:fld id="{09FAC59A-2554-7441-A138-FBAFD49FADCF}" type="slidenum">
               <a:rPr lang="en-US" smtClean="0"/>
+              <a:t>‹#›</a:t>
             </a:fld>
             <a:endParaRPr lang="en-US"/>
           </a:p>
@@ -586,6 +605,7 @@
           <a:p>
             <a:fld id="{09FAC59A-2554-7441-A138-FBAFD49FADCF}" type="slidenum">
               <a:rPr lang="en-US" smtClean="0"/>
+              <a:t>1</a:t>
             </a:fld>
             <a:endParaRPr lang="en-US"/>
           </a:p>
@@ -669,6 +689,7 @@
           <a:p>
             <a:fld id="{09FAC59A-2554-7441-A138-FBAFD49FADCF}" type="slidenum">
               <a:rPr lang="en-US" smtClean="0"/>
+              <a:t>10</a:t>
             </a:fld>
             <a:endParaRPr lang="en-US"/>
           </a:p>
@@ -752,6 +773,7 @@
           <a:p>
             <a:fld id="{09FAC59A-2554-7441-A138-FBAFD49FADCF}" type="slidenum">
               <a:rPr lang="en-US" smtClean="0"/>
+              <a:t>11</a:t>
             </a:fld>
             <a:endParaRPr lang="en-US"/>
           </a:p>
@@ -835,6 +857,7 @@
           <a:p>
             <a:fld id="{09FAC59A-2554-7441-A138-FBAFD49FADCF}" type="slidenum">
               <a:rPr lang="en-US" smtClean="0"/>
+              <a:t>12</a:t>
             </a:fld>
             <a:endParaRPr lang="en-US"/>
           </a:p>
@@ -918,6 +941,7 @@
           <a:p>
             <a:fld id="{09FAC59A-2554-7441-A138-FBAFD49FADCF}" type="slidenum">
               <a:rPr lang="en-US" smtClean="0"/>
+              <a:t>13</a:t>
             </a:fld>
             <a:endParaRPr lang="en-US"/>
           </a:p>
@@ -980,7 +1004,7 @@
           <a:bodyPr/>
           <a:lstStyle/>
           <a:p>
-            <a:endParaRPr kumimoji="1" lang="zh-CN" altLang="en-US" sz="2400" dirty="0"/>
+            <a:endParaRPr lang="en-US" altLang="zh-CN" sz="2400" dirty="0"/>
           </a:p>
         </p:txBody>
       </p:sp>
@@ -1001,6 +1025,91 @@
           <a:p>
             <a:fld id="{09FAC59A-2554-7441-A138-FBAFD49FADCF}" type="slidenum">
               <a:rPr lang="en-US" smtClean="0"/>
+              <a:t>14</a:t>
+            </a:fld>
+            <a:endParaRPr lang="en-US"/>
+          </a:p>
+        </p:txBody>
+      </p:sp>
+    </p:spTree>
+  </p:cSld>
+  <p:clrMapOvr>
+    <a:masterClrMapping/>
+  </p:clrMapOvr>
+</p:notes>
+</file>
+
+<file path=ppt/notesSlides/notesSlide15.xml><?xml version="1.0" encoding="utf-8"?>
+<p:notes xmlns:a="http://schemas.openxmlformats.org/drawingml/2006/main" xmlns:r="http://schemas.openxmlformats.org/officeDocument/2006/relationships" xmlns:p="http://schemas.openxmlformats.org/presentationml/2006/main">
+  <p:cSld>
+    <p:spTree>
+      <p:nvGrpSpPr>
+        <p:cNvPr id="1" name=""/>
+        <p:cNvGrpSpPr/>
+        <p:nvPr/>
+      </p:nvGrpSpPr>
+      <p:grpSpPr>
+        <a:xfrm>
+          <a:off x="0" y="0"/>
+          <a:ext cx="0" cy="0"/>
+          <a:chOff x="0" y="0"/>
+          <a:chExt cx="0" cy="0"/>
+        </a:xfrm>
+      </p:grpSpPr>
+      <p:sp>
+        <p:nvSpPr>
+          <p:cNvPr id="2" name="幻灯片图像占位符 1"/>
+          <p:cNvSpPr>
+            <a:spLocks noGrp="1" noRot="1" noChangeAspect="1"/>
+          </p:cNvSpPr>
+          <p:nvPr>
+            <p:ph type="sldImg"/>
+          </p:nvPr>
+        </p:nvSpPr>
+        <p:spPr>
+          <a:xfrm>
+            <a:off x="685800" y="1143000"/>
+            <a:ext cx="5486400" cy="3086100"/>
+          </a:xfrm>
+        </p:spPr>
+      </p:sp>
+      <p:sp>
+        <p:nvSpPr>
+          <p:cNvPr id="3" name="备注占位符 2"/>
+          <p:cNvSpPr>
+            <a:spLocks noGrp="1"/>
+          </p:cNvSpPr>
+          <p:nvPr>
+            <p:ph type="body" idx="1"/>
+          </p:nvPr>
+        </p:nvSpPr>
+        <p:spPr/>
+        <p:txBody>
+          <a:bodyPr/>
+          <a:lstStyle/>
+          <a:p>
+            <a:endParaRPr kumimoji="1" lang="zh-CN" altLang="en-US" sz="2400" dirty="0"/>
+          </a:p>
+        </p:txBody>
+      </p:sp>
+      <p:sp>
+        <p:nvSpPr>
+          <p:cNvPr id="4" name="幻灯片编号占位符 3"/>
+          <p:cNvSpPr>
+            <a:spLocks noGrp="1"/>
+          </p:cNvSpPr>
+          <p:nvPr>
+            <p:ph type="sldNum" sz="quarter" idx="10"/>
+          </p:nvPr>
+        </p:nvSpPr>
+        <p:spPr/>
+        <p:txBody>
+          <a:bodyPr/>
+          <a:lstStyle/>
+          <a:p>
+            <a:fld id="{09FAC59A-2554-7441-A138-FBAFD49FADCF}" type="slidenum">
+              <a:rPr lang="en-US" smtClean="0"/>
+              <a:t>15</a:t>
             </a:fld>
             <a:endParaRPr lang="en-US"/>
           </a:p>
@@ -1084,6 +1193,7 @@
           <a:p>
             <a:fld id="{09FAC59A-2554-7441-A138-FBAFD49FADCF}" type="slidenum">
               <a:rPr lang="en-US" smtClean="0"/>
+              <a:t>2</a:t>
             </a:fld>
             <a:endParaRPr lang="en-US"/>
           </a:p>
@@ -1167,6 +1277,7 @@
           <a:p>
             <a:fld id="{09FAC59A-2554-7441-A138-FBAFD49FADCF}" type="slidenum">
               <a:rPr lang="en-US" smtClean="0"/>
+              <a:t>3</a:t>
             </a:fld>
             <a:endParaRPr lang="en-US"/>
           </a:p>
@@ -1250,6 +1361,7 @@
           <a:p>
             <a:fld id="{09FAC59A-2554-7441-A138-FBAFD49FADCF}" type="slidenum">
               <a:rPr lang="en-US" smtClean="0"/>
+              <a:t>4</a:t>
             </a:fld>
             <a:endParaRPr lang="en-US"/>
           </a:p>
@@ -1333,6 +1445,7 @@
           <a:p>
             <a:fld id="{09FAC59A-2554-7441-A138-FBAFD49FADCF}" type="slidenum">
               <a:rPr lang="en-US" smtClean="0"/>
+              <a:t>5</a:t>
             </a:fld>
             <a:endParaRPr lang="en-US"/>
           </a:p>
@@ -1416,6 +1529,7 @@
           <a:p>
             <a:fld id="{09FAC59A-2554-7441-A138-FBAFD49FADCF}" type="slidenum">
               <a:rPr lang="en-US" smtClean="0"/>
+              <a:t>6</a:t>
             </a:fld>
             <a:endParaRPr lang="en-US"/>
           </a:p>
@@ -1499,6 +1613,7 @@
           <a:p>
             <a:fld id="{09FAC59A-2554-7441-A138-FBAFD49FADCF}" type="slidenum">
               <a:rPr lang="en-US" smtClean="0"/>
+              <a:t>7</a:t>
             </a:fld>
             <a:endParaRPr lang="en-US"/>
           </a:p>
@@ -1582,12 +1697,18 @@
           <a:p>
             <a:fld id="{09FAC59A-2554-7441-A138-FBAFD49FADCF}" type="slidenum">
               <a:rPr lang="en-US" smtClean="0"/>
+              <a:t>8</a:t>
             </a:fld>
             <a:endParaRPr lang="en-US"/>
           </a:p>
         </p:txBody>
       </p:sp>
     </p:spTree>
+    <p:extLst>
+      <p:ext uri="{BB962C8B-B14F-4D97-AF65-F5344CB8AC3E}">
+        <p14:creationId xmlns:p14="http://schemas.microsoft.com/office/powerpoint/2010/main" val="2698802211"/>
+      </p:ext>
+    </p:extLst>
   </p:cSld>
   <p:clrMapOvr>
     <a:masterClrMapping/>
@@ -1665,6 +1786,7 @@
           <a:p>
             <a:fld id="{09FAC59A-2554-7441-A138-FBAFD49FADCF}" type="slidenum">
               <a:rPr lang="en-US" smtClean="0"/>
+              <a:t>9</a:t>
             </a:fld>
             <a:endParaRPr lang="en-US"/>
           </a:p>
@@ -1809,6 +1931,7 @@
           <a:p>
             <a:fld id="{CE875574-B30F-E946-8A30-5D40B09C42BE}" type="datetimeFigureOut">
               <a:rPr lang="en-US" smtClean="0"/>
+              <a:t>6/10/22</a:t>
             </a:fld>
             <a:endParaRPr lang="en-US"/>
           </a:p>
@@ -1850,6 +1973,7 @@
           <a:p>
             <a:fld id="{671D2AD8-20DD-1F43-B782-FEE6429B9542}" type="slidenum">
               <a:rPr lang="en-US" smtClean="0"/>
+              <a:t>‹#›</a:t>
             </a:fld>
             <a:endParaRPr lang="en-US"/>
           </a:p>
@@ -1923,7 +2047,6 @@
               <a:rPr lang="zh-CN" altLang="en-US"/>
               <a:t>单击此处编辑母版文本样式</a:t>
             </a:r>
-            <a:endParaRPr lang="zh-CN" altLang="en-US"/>
           </a:p>
           <a:p>
             <a:pPr lvl="1"/>
@@ -1931,7 +2054,6 @@
               <a:rPr lang="zh-CN" altLang="en-US"/>
               <a:t>二级</a:t>
             </a:r>
-            <a:endParaRPr lang="zh-CN" altLang="en-US"/>
           </a:p>
           <a:p>
             <a:pPr lvl="2"/>
@@ -1939,7 +2061,6 @@
               <a:rPr lang="zh-CN" altLang="en-US"/>
               <a:t>三级</a:t>
             </a:r>
-            <a:endParaRPr lang="zh-CN" altLang="en-US"/>
           </a:p>
           <a:p>
             <a:pPr lvl="3"/>
@@ -1947,7 +2068,6 @@
               <a:rPr lang="zh-CN" altLang="en-US"/>
               <a:t>四级</a:t>
             </a:r>
-            <a:endParaRPr lang="zh-CN" altLang="en-US"/>
           </a:p>
           <a:p>
             <a:pPr lvl="4"/>
@@ -1976,6 +2096,7 @@
           <a:p>
             <a:fld id="{CE875574-B30F-E946-8A30-5D40B09C42BE}" type="datetimeFigureOut">
               <a:rPr lang="en-US" smtClean="0"/>
+              <a:t>6/10/22</a:t>
             </a:fld>
             <a:endParaRPr lang="en-US"/>
           </a:p>
@@ -2017,6 +2138,7 @@
           <a:p>
             <a:fld id="{671D2AD8-20DD-1F43-B782-FEE6429B9542}" type="slidenum">
               <a:rPr lang="en-US" smtClean="0"/>
+              <a:t>‹#›</a:t>
             </a:fld>
             <a:endParaRPr lang="en-US"/>
           </a:p>
@@ -2100,7 +2222,6 @@
               <a:rPr lang="zh-CN" altLang="en-US"/>
               <a:t>单击此处编辑母版文本样式</a:t>
             </a:r>
-            <a:endParaRPr lang="zh-CN" altLang="en-US"/>
           </a:p>
           <a:p>
             <a:pPr lvl="1"/>
@@ -2108,7 +2229,6 @@
               <a:rPr lang="zh-CN" altLang="en-US"/>
               <a:t>二级</a:t>
             </a:r>
-            <a:endParaRPr lang="zh-CN" altLang="en-US"/>
           </a:p>
           <a:p>
             <a:pPr lvl="2"/>
@@ -2116,7 +2236,6 @@
               <a:rPr lang="zh-CN" altLang="en-US"/>
               <a:t>三级</a:t>
             </a:r>
-            <a:endParaRPr lang="zh-CN" altLang="en-US"/>
           </a:p>
           <a:p>
             <a:pPr lvl="3"/>
@@ -2124,7 +2243,6 @@
               <a:rPr lang="zh-CN" altLang="en-US"/>
               <a:t>四级</a:t>
             </a:r>
-            <a:endParaRPr lang="zh-CN" altLang="en-US"/>
           </a:p>
           <a:p>
             <a:pPr lvl="4"/>
@@ -2153,6 +2271,7 @@
           <a:p>
             <a:fld id="{CE875574-B30F-E946-8A30-5D40B09C42BE}" type="datetimeFigureOut">
               <a:rPr lang="en-US" smtClean="0"/>
+              <a:t>6/10/22</a:t>
             </a:fld>
             <a:endParaRPr lang="en-US"/>
           </a:p>
@@ -2194,6 +2313,7 @@
           <a:p>
             <a:fld id="{671D2AD8-20DD-1F43-B782-FEE6429B9542}" type="slidenum">
               <a:rPr lang="en-US" smtClean="0"/>
+              <a:t>‹#›</a:t>
             </a:fld>
             <a:endParaRPr lang="en-US"/>
           </a:p>
@@ -2342,7 +2462,6 @@
               <a:rPr lang="zh-CN" altLang="en-US"/>
               <a:t>单击此处编辑母版文本样式</a:t>
             </a:r>
-            <a:endParaRPr lang="zh-CN" altLang="en-US"/>
           </a:p>
           <a:p>
             <a:pPr lvl="1"/>
@@ -2350,7 +2469,6 @@
               <a:rPr lang="zh-CN" altLang="en-US"/>
               <a:t>二级</a:t>
             </a:r>
-            <a:endParaRPr lang="zh-CN" altLang="en-US"/>
           </a:p>
           <a:p>
             <a:pPr lvl="2"/>
@@ -2358,7 +2476,6 @@
               <a:rPr lang="zh-CN" altLang="en-US"/>
               <a:t>三级</a:t>
             </a:r>
-            <a:endParaRPr lang="zh-CN" altLang="en-US"/>
           </a:p>
           <a:p>
             <a:pPr lvl="3"/>
@@ -2366,7 +2483,6 @@
               <a:rPr lang="zh-CN" altLang="en-US"/>
               <a:t>四级</a:t>
             </a:r>
-            <a:endParaRPr lang="zh-CN" altLang="en-US"/>
           </a:p>
           <a:p>
             <a:pPr lvl="4"/>
@@ -2395,6 +2511,7 @@
           <a:p>
             <a:fld id="{CE875574-B30F-E946-8A30-5D40B09C42BE}" type="datetimeFigureOut">
               <a:rPr lang="en-US" smtClean="0"/>
+              <a:t>6/10/22</a:t>
             </a:fld>
             <a:endParaRPr lang="en-US"/>
           </a:p>
@@ -2436,6 +2553,7 @@
           <a:p>
             <a:fld id="{671D2AD8-20DD-1F43-B782-FEE6429B9542}" type="slidenum">
               <a:rPr lang="en-US" smtClean="0"/>
+              <a:t>‹#›</a:t>
             </a:fld>
             <a:endParaRPr lang="en-US"/>
           </a:p>
@@ -2614,7 +2732,6 @@
               <a:rPr lang="zh-CN" altLang="en-US"/>
               <a:t>单击此处编辑母版文本样式</a:t>
             </a:r>
-            <a:endParaRPr lang="zh-CN" altLang="en-US"/>
           </a:p>
         </p:txBody>
       </p:sp>
@@ -2635,6 +2752,7 @@
           <a:p>
             <a:fld id="{CE875574-B30F-E946-8A30-5D40B09C42BE}" type="datetimeFigureOut">
               <a:rPr lang="en-US" smtClean="0"/>
+              <a:t>6/10/22</a:t>
             </a:fld>
             <a:endParaRPr lang="en-US"/>
           </a:p>
@@ -2676,6 +2794,7 @@
           <a:p>
             <a:fld id="{671D2AD8-20DD-1F43-B782-FEE6429B9542}" type="slidenum">
               <a:rPr lang="en-US" smtClean="0"/>
+              <a:t>‹#›</a:t>
             </a:fld>
             <a:endParaRPr lang="en-US"/>
           </a:p>
@@ -2754,7 +2873,6 @@
               <a:rPr lang="zh-CN" altLang="en-US"/>
               <a:t>单击此处编辑母版文本样式</a:t>
             </a:r>
-            <a:endParaRPr lang="zh-CN" altLang="en-US"/>
           </a:p>
           <a:p>
             <a:pPr lvl="1"/>
@@ -2762,7 +2880,6 @@
               <a:rPr lang="zh-CN" altLang="en-US"/>
               <a:t>二级</a:t>
             </a:r>
-            <a:endParaRPr lang="zh-CN" altLang="en-US"/>
           </a:p>
           <a:p>
             <a:pPr lvl="2"/>
@@ -2770,7 +2887,6 @@
               <a:rPr lang="zh-CN" altLang="en-US"/>
               <a:t>三级</a:t>
             </a:r>
-            <a:endParaRPr lang="zh-CN" altLang="en-US"/>
           </a:p>
           <a:p>
             <a:pPr lvl="3"/>
@@ -2778,7 +2894,6 @@
               <a:rPr lang="zh-CN" altLang="en-US"/>
               <a:t>四级</a:t>
             </a:r>
-            <a:endParaRPr lang="zh-CN" altLang="en-US"/>
           </a:p>
           <a:p>
             <a:pPr lvl="4"/>
@@ -2815,7 +2930,6 @@
               <a:rPr lang="zh-CN" altLang="en-US"/>
               <a:t>单击此处编辑母版文本样式</a:t>
             </a:r>
-            <a:endParaRPr lang="zh-CN" altLang="en-US"/>
           </a:p>
           <a:p>
             <a:pPr lvl="1"/>
@@ -2823,7 +2937,6 @@
               <a:rPr lang="zh-CN" altLang="en-US"/>
               <a:t>二级</a:t>
             </a:r>
-            <a:endParaRPr lang="zh-CN" altLang="en-US"/>
           </a:p>
           <a:p>
             <a:pPr lvl="2"/>
@@ -2831,7 +2944,6 @@
               <a:rPr lang="zh-CN" altLang="en-US"/>
               <a:t>三级</a:t>
             </a:r>
-            <a:endParaRPr lang="zh-CN" altLang="en-US"/>
           </a:p>
           <a:p>
             <a:pPr lvl="3"/>
@@ -2839,7 +2951,6 @@
               <a:rPr lang="zh-CN" altLang="en-US"/>
               <a:t>四级</a:t>
             </a:r>
-            <a:endParaRPr lang="zh-CN" altLang="en-US"/>
           </a:p>
           <a:p>
             <a:pPr lvl="4"/>
@@ -2868,6 +2979,7 @@
           <a:p>
             <a:fld id="{CE875574-B30F-E946-8A30-5D40B09C42BE}" type="datetimeFigureOut">
               <a:rPr lang="en-US" smtClean="0"/>
+              <a:t>6/10/22</a:t>
             </a:fld>
             <a:endParaRPr lang="en-US"/>
           </a:p>
@@ -2909,6 +3021,7 @@
           <a:p>
             <a:fld id="{671D2AD8-20DD-1F43-B782-FEE6429B9542}" type="slidenum">
               <a:rPr lang="en-US" smtClean="0"/>
+              <a:t>‹#›</a:t>
             </a:fld>
             <a:endParaRPr lang="en-US"/>
           </a:p>
@@ -3029,7 +3142,6 @@
               <a:rPr lang="zh-CN" altLang="en-US"/>
               <a:t>单击此处编辑母版文本样式</a:t>
             </a:r>
-            <a:endParaRPr lang="zh-CN" altLang="en-US"/>
           </a:p>
         </p:txBody>
       </p:sp>
@@ -3058,7 +3170,6 @@
               <a:rPr lang="zh-CN" altLang="en-US"/>
               <a:t>单击此处编辑母版文本样式</a:t>
             </a:r>
-            <a:endParaRPr lang="zh-CN" altLang="en-US"/>
           </a:p>
           <a:p>
             <a:pPr lvl="1"/>
@@ -3066,7 +3177,6 @@
               <a:rPr lang="zh-CN" altLang="en-US"/>
               <a:t>二级</a:t>
             </a:r>
-            <a:endParaRPr lang="zh-CN" altLang="en-US"/>
           </a:p>
           <a:p>
             <a:pPr lvl="2"/>
@@ -3074,7 +3184,6 @@
               <a:rPr lang="zh-CN" altLang="en-US"/>
               <a:t>三级</a:t>
             </a:r>
-            <a:endParaRPr lang="zh-CN" altLang="en-US"/>
           </a:p>
           <a:p>
             <a:pPr lvl="3"/>
@@ -3082,7 +3191,6 @@
               <a:rPr lang="zh-CN" altLang="en-US"/>
               <a:t>四级</a:t>
             </a:r>
-            <a:endParaRPr lang="zh-CN" altLang="en-US"/>
           </a:p>
           <a:p>
             <a:pPr lvl="4"/>
@@ -3156,7 +3264,6 @@
               <a:rPr lang="zh-CN" altLang="en-US"/>
               <a:t>单击此处编辑母版文本样式</a:t>
             </a:r>
-            <a:endParaRPr lang="zh-CN" altLang="en-US"/>
           </a:p>
         </p:txBody>
       </p:sp>
@@ -3185,7 +3292,6 @@
               <a:rPr lang="zh-CN" altLang="en-US"/>
               <a:t>单击此处编辑母版文本样式</a:t>
             </a:r>
-            <a:endParaRPr lang="zh-CN" altLang="en-US"/>
           </a:p>
           <a:p>
             <a:pPr lvl="1"/>
@@ -3193,7 +3299,6 @@
               <a:rPr lang="zh-CN" altLang="en-US"/>
               <a:t>二级</a:t>
             </a:r>
-            <a:endParaRPr lang="zh-CN" altLang="en-US"/>
           </a:p>
           <a:p>
             <a:pPr lvl="2"/>
@@ -3201,7 +3306,6 @@
               <a:rPr lang="zh-CN" altLang="en-US"/>
               <a:t>三级</a:t>
             </a:r>
-            <a:endParaRPr lang="zh-CN" altLang="en-US"/>
           </a:p>
           <a:p>
             <a:pPr lvl="3"/>
@@ -3209,7 +3313,6 @@
               <a:rPr lang="zh-CN" altLang="en-US"/>
               <a:t>四级</a:t>
             </a:r>
-            <a:endParaRPr lang="zh-CN" altLang="en-US"/>
           </a:p>
           <a:p>
             <a:pPr lvl="4"/>
@@ -3238,6 +3341,7 @@
           <a:p>
             <a:fld id="{CE875574-B30F-E946-8A30-5D40B09C42BE}" type="datetimeFigureOut">
               <a:rPr lang="en-US" smtClean="0"/>
+              <a:t>6/10/22</a:t>
             </a:fld>
             <a:endParaRPr lang="en-US"/>
           </a:p>
@@ -3279,6 +3383,7 @@
           <a:p>
             <a:fld id="{671D2AD8-20DD-1F43-B782-FEE6429B9542}" type="slidenum">
               <a:rPr lang="en-US" smtClean="0"/>
+              <a:t>‹#›</a:t>
             </a:fld>
             <a:endParaRPr lang="en-US"/>
           </a:p>
@@ -3349,6 +3454,7 @@
           <a:p>
             <a:fld id="{CE875574-B30F-E946-8A30-5D40B09C42BE}" type="datetimeFigureOut">
               <a:rPr lang="en-US" smtClean="0"/>
+              <a:t>6/10/22</a:t>
             </a:fld>
             <a:endParaRPr lang="en-US"/>
           </a:p>
@@ -3390,6 +3496,7 @@
           <a:p>
             <a:fld id="{671D2AD8-20DD-1F43-B782-FEE6429B9542}" type="slidenum">
               <a:rPr lang="en-US" smtClean="0"/>
+              <a:t>‹#›</a:t>
             </a:fld>
             <a:endParaRPr lang="en-US"/>
           </a:p>
@@ -3437,6 +3544,7 @@
           <a:p>
             <a:fld id="{CE875574-B30F-E946-8A30-5D40B09C42BE}" type="datetimeFigureOut">
               <a:rPr lang="en-US" smtClean="0"/>
+              <a:t>6/10/22</a:t>
             </a:fld>
             <a:endParaRPr lang="en-US"/>
           </a:p>
@@ -3478,6 +3586,7 @@
           <a:p>
             <a:fld id="{671D2AD8-20DD-1F43-B782-FEE6429B9542}" type="slidenum">
               <a:rPr lang="en-US" smtClean="0"/>
+              <a:t>‹#›</a:t>
             </a:fld>
             <a:endParaRPr lang="en-US"/>
           </a:p>
@@ -3593,7 +3702,6 @@
               <a:rPr lang="zh-CN" altLang="en-US"/>
               <a:t>单击此处编辑母版文本样式</a:t>
             </a:r>
-            <a:endParaRPr lang="zh-CN" altLang="en-US"/>
           </a:p>
           <a:p>
             <a:pPr lvl="1"/>
@@ -3601,7 +3709,6 @@
               <a:rPr lang="zh-CN" altLang="en-US"/>
               <a:t>二级</a:t>
             </a:r>
-            <a:endParaRPr lang="zh-CN" altLang="en-US"/>
           </a:p>
           <a:p>
             <a:pPr lvl="2"/>
@@ -3609,7 +3716,6 @@
               <a:rPr lang="zh-CN" altLang="en-US"/>
               <a:t>三级</a:t>
             </a:r>
-            <a:endParaRPr lang="zh-CN" altLang="en-US"/>
           </a:p>
           <a:p>
             <a:pPr lvl="3"/>
@@ -3617,7 +3723,6 @@
               <a:rPr lang="zh-CN" altLang="en-US"/>
               <a:t>四级</a:t>
             </a:r>
-            <a:endParaRPr lang="zh-CN" altLang="en-US"/>
           </a:p>
           <a:p>
             <a:pPr lvl="4"/>
@@ -3691,7 +3796,6 @@
               <a:rPr lang="zh-CN" altLang="en-US"/>
               <a:t>单击此处编辑母版文本样式</a:t>
             </a:r>
-            <a:endParaRPr lang="zh-CN" altLang="en-US"/>
           </a:p>
         </p:txBody>
       </p:sp>
@@ -3712,6 +3816,7 @@
           <a:p>
             <a:fld id="{CE875574-B30F-E946-8A30-5D40B09C42BE}" type="datetimeFigureOut">
               <a:rPr lang="en-US" smtClean="0"/>
+              <a:t>6/10/22</a:t>
             </a:fld>
             <a:endParaRPr lang="en-US"/>
           </a:p>
@@ -3753,6 +3858,7 @@
           <a:p>
             <a:fld id="{671D2AD8-20DD-1F43-B782-FEE6429B9542}" type="slidenum">
               <a:rPr lang="en-US" smtClean="0"/>
+              <a:t>‹#›</a:t>
             </a:fld>
             <a:endParaRPr lang="en-US"/>
           </a:p>
@@ -3942,7 +4048,6 @@
               <a:rPr lang="zh-CN" altLang="en-US"/>
               <a:t>单击此处编辑母版文本样式</a:t>
             </a:r>
-            <a:endParaRPr lang="zh-CN" altLang="en-US"/>
           </a:p>
         </p:txBody>
       </p:sp>
@@ -3963,6 +4068,7 @@
           <a:p>
             <a:fld id="{CE875574-B30F-E946-8A30-5D40B09C42BE}" type="datetimeFigureOut">
               <a:rPr lang="en-US" smtClean="0"/>
+              <a:t>6/10/22</a:t>
             </a:fld>
             <a:endParaRPr lang="en-US"/>
           </a:p>
@@ -4004,6 +4110,7 @@
           <a:p>
             <a:fld id="{671D2AD8-20DD-1F43-B782-FEE6429B9542}" type="slidenum">
               <a:rPr lang="en-US" smtClean="0"/>
+              <a:t>‹#›</a:t>
             </a:fld>
             <a:endParaRPr lang="en-US"/>
           </a:p>
@@ -4102,7 +4209,6 @@
               <a:rPr lang="zh-CN" altLang="en-US"/>
               <a:t>单击此处编辑母版文本样式</a:t>
             </a:r>
-            <a:endParaRPr lang="zh-CN" altLang="en-US"/>
           </a:p>
           <a:p>
             <a:pPr lvl="1"/>
@@ -4110,7 +4216,6 @@
               <a:rPr lang="zh-CN" altLang="en-US"/>
               <a:t>二级</a:t>
             </a:r>
-            <a:endParaRPr lang="zh-CN" altLang="en-US"/>
           </a:p>
           <a:p>
             <a:pPr lvl="2"/>
@@ -4118,7 +4223,6 @@
               <a:rPr lang="zh-CN" altLang="en-US"/>
               <a:t>三级</a:t>
             </a:r>
-            <a:endParaRPr lang="zh-CN" altLang="en-US"/>
           </a:p>
           <a:p>
             <a:pPr lvl="3"/>
@@ -4126,7 +4230,6 @@
               <a:rPr lang="zh-CN" altLang="en-US"/>
               <a:t>四级</a:t>
             </a:r>
-            <a:endParaRPr lang="zh-CN" altLang="en-US"/>
           </a:p>
           <a:p>
             <a:pPr lvl="4"/>
@@ -4173,6 +4276,7 @@
           <a:p>
             <a:fld id="{CE875574-B30F-E946-8A30-5D40B09C42BE}" type="datetimeFigureOut">
               <a:rPr lang="en-US" smtClean="0"/>
+              <a:t>6/10/22</a:t>
             </a:fld>
             <a:endParaRPr lang="en-US"/>
           </a:p>
@@ -4250,6 +4354,7 @@
           <a:p>
             <a:fld id="{671D2AD8-20DD-1F43-B782-FEE6429B9542}" type="slidenum">
               <a:rPr lang="en-US" smtClean="0"/>
+              <a:t>‹#›</a:t>
             </a:fld>
             <a:endParaRPr lang="en-US"/>
           </a:p>
@@ -4581,7 +4686,7 @@
           <p:nvPr/>
         </p:nvPicPr>
         <p:blipFill>
-          <a:blip r:embed="rId1">
+          <a:blip r:embed="rId3">
             <a:clrChange>
               <a:clrFrom>
                 <a:srgbClr val="FFFFFF"/>
@@ -5035,7 +5140,6 @@
               <a:rPr lang="en-US" altLang="zh-CN" dirty="0"/>
               <a:t>2022.6.11</a:t>
             </a:r>
-            <a:endParaRPr lang="en-US" altLang="zh-CN" dirty="0"/>
           </a:p>
           <a:p>
             <a:endParaRPr lang="en-US" altLang="zh-CN" dirty="0"/>
@@ -5052,10 +5156,6 @@
               </a:rPr>
               <a:t>docker run -it uintr/demo</a:t>
             </a:r>
-            <a:endParaRPr lang="en-US" altLang="zh-CN" dirty="0">
-              <a:latin typeface="Consolas" panose="020B0609020204030204" charset="0"/>
-              <a:cs typeface="Consolas" panose="020B0609020204030204" charset="0"/>
-            </a:endParaRPr>
           </a:p>
         </p:txBody>
       </p:sp>
@@ -5226,7 +5326,7 @@
           <p:nvPr/>
         </p:nvPicPr>
         <p:blipFill>
-          <a:blip r:embed="rId1">
+          <a:blip r:embed="rId3">
             <a:clrChange>
               <a:clrFrom>
                 <a:srgbClr val="FFFFFF"/>
@@ -5650,9 +5750,6 @@
               </a:rPr>
               <a:t>性能测试结果</a:t>
             </a:r>
-            <a:endParaRPr lang="zh-CN" altLang="en-US" dirty="0">
-              <a:latin typeface="+mn-ea"/>
-            </a:endParaRPr>
           </a:p>
         </p:txBody>
       </p:sp>
@@ -5665,7 +5762,7 @@
           <p:nvPr/>
         </p:nvPicPr>
         <p:blipFill>
-          <a:blip r:embed="rId2"/>
+          <a:blip r:embed="rId4"/>
           <a:stretch>
             <a:fillRect/>
           </a:stretch>
@@ -5689,7 +5786,7 @@
           <p:nvPr/>
         </p:nvPicPr>
         <p:blipFill>
-          <a:blip r:embed="rId3"/>
+          <a:blip r:embed="rId5"/>
           <a:stretch>
             <a:fillRect/>
           </a:stretch>
@@ -5724,6 +5821,7 @@
           <a:bodyPr wrap="square" rtlCol="0">
             <a:spAutoFit/>
           </a:bodyPr>
+          <a:lstStyle/>
           <a:p>
             <a:r>
               <a:rPr lang="zh-CN" altLang="en-US"/>
@@ -5739,30 +5837,30 @@
             </a:r>
             <a:r>
               <a:rPr lang="en-US" altLang="zh-CN"/>
-              <a:t>pipe</a:t>
-            </a:r>
-            <a:endParaRPr lang="en-US" altLang="zh-CN"/>
+              <a:t>eventfd</a:t>
+            </a:r>
           </a:p>
         </p:txBody>
       </p:sp>
       <p:pic>
         <p:nvPicPr>
-          <p:cNvPr id="4" name="图片 3"/>
+          <p:cNvPr id="3" name="图片 2"/>
           <p:cNvPicPr>
             <a:picLocks noChangeAspect="1"/>
           </p:cNvPicPr>
           <p:nvPr/>
         </p:nvPicPr>
         <p:blipFill>
-          <a:blip r:embed="rId4"/>
+          <a:blip r:embed="rId6"/>
+          <a:srcRect l="819"/>
           <a:stretch>
             <a:fillRect/>
           </a:stretch>
         </p:blipFill>
         <p:spPr>
           <a:xfrm>
-            <a:off x="7133590" y="4523740"/>
-            <a:ext cx="3925570" cy="2137410"/>
+            <a:off x="7150100" y="4454525"/>
+            <a:ext cx="3998595" cy="2186305"/>
           </a:xfrm>
           <a:prstGeom prst="rect">
             <a:avLst/>
@@ -5936,7 +6034,7 @@
           <p:nvPr/>
         </p:nvPicPr>
         <p:blipFill>
-          <a:blip r:embed="rId1">
+          <a:blip r:embed="rId3">
             <a:clrChange>
               <a:clrFrom>
                 <a:srgbClr val="FFFFFF"/>
@@ -6360,9 +6458,6 @@
               </a:rPr>
               <a:t>性能测试结果</a:t>
             </a:r>
-            <a:endParaRPr lang="zh-CN" altLang="en-US" dirty="0">
-              <a:latin typeface="+mn-ea"/>
-            </a:endParaRPr>
           </a:p>
         </p:txBody>
       </p:sp>
@@ -6375,7 +6470,7 @@
           <p:nvPr/>
         </p:nvPicPr>
         <p:blipFill>
-          <a:blip r:embed="rId2"/>
+          <a:blip r:embed="rId4"/>
           <a:stretch>
             <a:fillRect/>
           </a:stretch>
@@ -6399,7 +6494,7 @@
           <p:nvPr/>
         </p:nvPicPr>
         <p:blipFill>
-          <a:blip r:embed="rId3"/>
+          <a:blip r:embed="rId5"/>
           <a:stretch>
             <a:fillRect/>
           </a:stretch>
@@ -6434,6 +6529,7 @@
           <a:bodyPr wrap="square" rtlCol="0">
             <a:spAutoFit/>
           </a:bodyPr>
+          <a:lstStyle/>
           <a:p>
             <a:r>
               <a:rPr lang="zh-CN" altLang="en-US"/>
@@ -6449,30 +6545,29 @@
             </a:r>
             <a:r>
               <a:rPr lang="en-US" altLang="zh-CN"/>
-              <a:t>domain</a:t>
-            </a:r>
-            <a:endParaRPr lang="en-US" altLang="zh-CN"/>
+              <a:t>pipe</a:t>
+            </a:r>
           </a:p>
         </p:txBody>
       </p:sp>
       <p:pic>
         <p:nvPicPr>
-          <p:cNvPr id="3" name="图片 2"/>
+          <p:cNvPr id="4" name="图片 3"/>
           <p:cNvPicPr>
             <a:picLocks noChangeAspect="1"/>
           </p:cNvPicPr>
           <p:nvPr/>
         </p:nvPicPr>
         <p:blipFill>
-          <a:blip r:embed="rId4"/>
+          <a:blip r:embed="rId6"/>
           <a:stretch>
             <a:fillRect/>
           </a:stretch>
         </p:blipFill>
         <p:spPr>
           <a:xfrm>
-            <a:off x="7146290" y="4561205"/>
-            <a:ext cx="3918585" cy="2085975"/>
+            <a:off x="7133590" y="4523740"/>
+            <a:ext cx="3925570" cy="2137410"/>
           </a:xfrm>
           <a:prstGeom prst="rect">
             <a:avLst/>
@@ -6542,14 +6637,44 @@
           </a:lstStyle>
           <a:p>
             <a:r>
-              <a:rPr lang="zh-CN" altLang="en-US" sz="4000" b="1" dirty="0">
+              <a:rPr lang="en-US" altLang="zh-CN" sz="4000" b="1" dirty="0" err="1">
                 <a:solidFill>
                   <a:srgbClr val="704F95"/>
                 </a:solidFill>
                 <a:latin typeface="思源宋体 Medium" panose="02020500000000000000" pitchFamily="18" charset="-122"/>
                 <a:ea typeface="思源宋体 Medium" panose="02020500000000000000" pitchFamily="18" charset="-122"/>
               </a:rPr>
-              <a:t>工作过程管理</a:t>
+              <a:t>Uintr</a:t>
+            </a:r>
+            <a:r>
+              <a:rPr lang="zh-CN" altLang="en-US" sz="4000" b="1" dirty="0">
+                <a:solidFill>
+                  <a:srgbClr val="704F95"/>
+                </a:solidFill>
+                <a:latin typeface="思源宋体 Medium" panose="02020500000000000000" pitchFamily="18" charset="-122"/>
+                <a:ea typeface="思源宋体 Medium" panose="02020500000000000000" pitchFamily="18" charset="-122"/>
+              </a:rPr>
+              <a:t>性能测试</a:t>
+            </a:r>
+            <a:r>
+              <a:rPr lang="en-US" altLang="zh-CN" sz="4000" b="1" dirty="0">
+                <a:solidFill>
+                  <a:srgbClr val="704F95"/>
+                </a:solidFill>
+                <a:latin typeface="思源宋体 Medium" panose="02020500000000000000" pitchFamily="18" charset="-122"/>
+                <a:ea typeface="思源宋体 Medium" panose="02020500000000000000" pitchFamily="18" charset="-122"/>
+              </a:rPr>
+              <a:t>-</a:t>
+            </a:r>
+            <a:r>
+              <a:rPr lang="zh-CN" altLang="en-US" sz="4000" b="1" dirty="0">
+                <a:solidFill>
+                  <a:srgbClr val="704F95"/>
+                </a:solidFill>
+                <a:latin typeface="思源宋体 Medium" panose="02020500000000000000" pitchFamily="18" charset="-122"/>
+                <a:ea typeface="思源宋体 Medium" panose="02020500000000000000" pitchFamily="18" charset="-122"/>
+              </a:rPr>
+              <a:t>横向对比</a:t>
             </a:r>
             <a:endParaRPr lang="en-US" altLang="zh-CN" sz="4000" b="1" dirty="0">
               <a:solidFill>
@@ -6616,7 +6741,7 @@
           <p:nvPr/>
         </p:nvPicPr>
         <p:blipFill>
-          <a:blip r:embed="rId1">
+          <a:blip r:embed="rId3">
             <a:clrChange>
               <a:clrFrom>
                 <a:srgbClr val="FFFFFF"/>
@@ -6846,7 +6971,7 @@
         </p:nvSpPr>
         <p:spPr>
           <a:xfrm>
-            <a:off x="1113971" y="1801282"/>
+            <a:off x="1056186" y="1833032"/>
             <a:ext cx="10515600" cy="4351338"/>
           </a:xfrm>
           <a:prstGeom prst="rect">
@@ -7022,307 +7147,140 @@
             </a:lvl9pPr>
           </a:lstStyle>
           <a:p>
-            <a:endParaRPr lang="en-US" altLang="zh-CN" dirty="0">
-              <a:latin typeface="+mn-ea"/>
-            </a:endParaRPr>
-          </a:p>
-        </p:txBody>
-      </p:sp>
-      <p:sp>
-        <p:nvSpPr>
-          <p:cNvPr id="15" name="Content Placeholder 2"/>
-          <p:cNvSpPr txBox="1"/>
+            <a:r>
+              <a:rPr lang="zh-CN" altLang="en-US" dirty="0">
+                <a:latin typeface="+mn-ea"/>
+              </a:rPr>
+              <a:t>复现</a:t>
+            </a:r>
+            <a:r>
+              <a:rPr lang="en-US" altLang="zh-CN" dirty="0">
+                <a:latin typeface="+mn-ea"/>
+              </a:rPr>
+              <a:t> linux rfc </a:t>
+            </a:r>
+            <a:r>
+              <a:rPr lang="zh-CN" altLang="en-US" dirty="0">
+                <a:latin typeface="+mn-ea"/>
+              </a:rPr>
+              <a:t>性能测试结果</a:t>
+            </a:r>
+          </a:p>
+        </p:txBody>
+      </p:sp>
+      <p:pic>
+        <p:nvPicPr>
+          <p:cNvPr id="2" name="图片 1"/>
+          <p:cNvPicPr>
+            <a:picLocks noChangeAspect="1"/>
+          </p:cNvPicPr>
           <p:nvPr/>
-        </p:nvSpPr>
+        </p:nvPicPr>
+        <p:blipFill>
+          <a:blip r:embed="rId4"/>
+          <a:stretch>
+            <a:fillRect/>
+          </a:stretch>
+        </p:blipFill>
         <p:spPr>
           <a:xfrm>
-            <a:off x="1113971" y="1758689"/>
-            <a:ext cx="6954264" cy="2174628"/>
+            <a:off x="663575" y="2680970"/>
+            <a:ext cx="5708015" cy="2889250"/>
           </a:xfrm>
           <a:prstGeom prst="rect">
             <a:avLst/>
           </a:prstGeom>
         </p:spPr>
-        <p:txBody>
-          <a:bodyPr>
-            <a:normAutofit/>
+      </p:pic>
+      <p:pic>
+        <p:nvPicPr>
+          <p:cNvPr id="7" name="图片 6"/>
+          <p:cNvPicPr>
+            <a:picLocks noChangeAspect="1"/>
+          </p:cNvPicPr>
+          <p:nvPr/>
+        </p:nvPicPr>
+        <p:blipFill>
+          <a:blip r:embed="rId5"/>
+          <a:stretch>
+            <a:fillRect/>
+          </a:stretch>
+        </p:blipFill>
+        <p:spPr>
+          <a:xfrm>
+            <a:off x="7133590" y="2255520"/>
+            <a:ext cx="4031615" cy="2124710"/>
+          </a:xfrm>
+          <a:prstGeom prst="rect">
+            <a:avLst/>
+          </a:prstGeom>
+        </p:spPr>
+      </p:pic>
+      <p:sp>
+        <p:nvSpPr>
+          <p:cNvPr id="10" name="文本框 9"/>
+          <p:cNvSpPr txBox="1"/>
+          <p:nvPr/>
+        </p:nvSpPr>
+        <p:spPr>
+          <a:xfrm>
+            <a:off x="7250430" y="1706245"/>
+            <a:ext cx="3608705" cy="368300"/>
+          </a:xfrm>
+          <a:prstGeom prst="rect">
+            <a:avLst/>
+          </a:prstGeom>
+          <a:noFill/>
+        </p:spPr>
+        <p:txBody>
+          <a:bodyPr wrap="square" rtlCol="0">
+            <a:spAutoFit/>
           </a:bodyPr>
-          <a:lstStyle>
-            <a:lvl1pPr marL="228600" indent="-228600" algn="l" defTabSz="914400" rtl="0" eaLnBrk="1" latinLnBrk="0" hangingPunct="1">
-              <a:lnSpc>
-                <a:spcPct val="90000"/>
-              </a:lnSpc>
-              <a:spcBef>
-                <a:spcPts val="1000"/>
-              </a:spcBef>
-              <a:buFont typeface="Arial" panose="020B0604020202020204" pitchFamily="34" charset="0"/>
-              <a:buChar char="•"/>
-              <a:defRPr sz="2800" kern="1200">
-                <a:solidFill>
-                  <a:schemeClr val="tx1"/>
-                </a:solidFill>
-                <a:latin typeface="+mn-lt"/>
-                <a:ea typeface="+mn-ea"/>
-                <a:cs typeface="+mn-cs"/>
-              </a:defRPr>
-            </a:lvl1pPr>
-            <a:lvl2pPr marL="685800" indent="-228600" algn="l" defTabSz="914400" rtl="0" eaLnBrk="1" latinLnBrk="0" hangingPunct="1">
-              <a:lnSpc>
-                <a:spcPct val="90000"/>
-              </a:lnSpc>
-              <a:spcBef>
-                <a:spcPts val="500"/>
-              </a:spcBef>
-              <a:buFont typeface="Arial" panose="020B0604020202020204" pitchFamily="34" charset="0"/>
-              <a:buChar char="•"/>
-              <a:defRPr sz="2400" kern="1200">
-                <a:solidFill>
-                  <a:schemeClr val="tx1"/>
-                </a:solidFill>
-                <a:latin typeface="+mn-lt"/>
-                <a:ea typeface="+mn-ea"/>
-                <a:cs typeface="+mn-cs"/>
-              </a:defRPr>
-            </a:lvl2pPr>
-            <a:lvl3pPr marL="1143000" indent="-228600" algn="l" defTabSz="914400" rtl="0" eaLnBrk="1" latinLnBrk="0" hangingPunct="1">
-              <a:lnSpc>
-                <a:spcPct val="90000"/>
-              </a:lnSpc>
-              <a:spcBef>
-                <a:spcPts val="500"/>
-              </a:spcBef>
-              <a:buFont typeface="Arial" panose="020B0604020202020204" pitchFamily="34" charset="0"/>
-              <a:buChar char="•"/>
-              <a:defRPr sz="2000" kern="1200">
-                <a:solidFill>
-                  <a:schemeClr val="tx1"/>
-                </a:solidFill>
-                <a:latin typeface="+mn-lt"/>
-                <a:ea typeface="+mn-ea"/>
-                <a:cs typeface="+mn-cs"/>
-              </a:defRPr>
-            </a:lvl3pPr>
-            <a:lvl4pPr marL="1600200" indent="-228600" algn="l" defTabSz="914400" rtl="0" eaLnBrk="1" latinLnBrk="0" hangingPunct="1">
-              <a:lnSpc>
-                <a:spcPct val="90000"/>
-              </a:lnSpc>
-              <a:spcBef>
-                <a:spcPts val="500"/>
-              </a:spcBef>
-              <a:buFont typeface="Arial" panose="020B0604020202020204" pitchFamily="34" charset="0"/>
-              <a:buChar char="•"/>
-              <a:defRPr sz="1800" kern="1200">
-                <a:solidFill>
-                  <a:schemeClr val="tx1"/>
-                </a:solidFill>
-                <a:latin typeface="+mn-lt"/>
-                <a:ea typeface="+mn-ea"/>
-                <a:cs typeface="+mn-cs"/>
-              </a:defRPr>
-            </a:lvl4pPr>
-            <a:lvl5pPr marL="2057400" indent="-228600" algn="l" defTabSz="914400" rtl="0" eaLnBrk="1" latinLnBrk="0" hangingPunct="1">
-              <a:lnSpc>
-                <a:spcPct val="90000"/>
-              </a:lnSpc>
-              <a:spcBef>
-                <a:spcPts val="500"/>
-              </a:spcBef>
-              <a:buFont typeface="Arial" panose="020B0604020202020204" pitchFamily="34" charset="0"/>
-              <a:buChar char="•"/>
-              <a:defRPr sz="1800" kern="1200">
-                <a:solidFill>
-                  <a:schemeClr val="tx1"/>
-                </a:solidFill>
-                <a:latin typeface="+mn-lt"/>
-                <a:ea typeface="+mn-ea"/>
-                <a:cs typeface="+mn-cs"/>
-              </a:defRPr>
-            </a:lvl5pPr>
-            <a:lvl6pPr marL="2514600" indent="-228600" algn="l" defTabSz="914400" rtl="0" eaLnBrk="1" latinLnBrk="0" hangingPunct="1">
-              <a:lnSpc>
-                <a:spcPct val="90000"/>
-              </a:lnSpc>
-              <a:spcBef>
-                <a:spcPts val="500"/>
-              </a:spcBef>
-              <a:buFont typeface="Arial" panose="020B0604020202020204" pitchFamily="34" charset="0"/>
-              <a:buChar char="•"/>
-              <a:defRPr sz="1800" kern="1200">
-                <a:solidFill>
-                  <a:schemeClr val="tx1"/>
-                </a:solidFill>
-                <a:latin typeface="+mn-lt"/>
-                <a:ea typeface="+mn-ea"/>
-                <a:cs typeface="+mn-cs"/>
-              </a:defRPr>
-            </a:lvl6pPr>
-            <a:lvl7pPr marL="2971800" indent="-228600" algn="l" defTabSz="914400" rtl="0" eaLnBrk="1" latinLnBrk="0" hangingPunct="1">
-              <a:lnSpc>
-                <a:spcPct val="90000"/>
-              </a:lnSpc>
-              <a:spcBef>
-                <a:spcPts val="500"/>
-              </a:spcBef>
-              <a:buFont typeface="Arial" panose="020B0604020202020204" pitchFamily="34" charset="0"/>
-              <a:buChar char="•"/>
-              <a:defRPr sz="1800" kern="1200">
-                <a:solidFill>
-                  <a:schemeClr val="tx1"/>
-                </a:solidFill>
-                <a:latin typeface="+mn-lt"/>
-                <a:ea typeface="+mn-ea"/>
-                <a:cs typeface="+mn-cs"/>
-              </a:defRPr>
-            </a:lvl7pPr>
-            <a:lvl8pPr marL="3429000" indent="-228600" algn="l" defTabSz="914400" rtl="0" eaLnBrk="1" latinLnBrk="0" hangingPunct="1">
-              <a:lnSpc>
-                <a:spcPct val="90000"/>
-              </a:lnSpc>
-              <a:spcBef>
-                <a:spcPts val="500"/>
-              </a:spcBef>
-              <a:buFont typeface="Arial" panose="020B0604020202020204" pitchFamily="34" charset="0"/>
-              <a:buChar char="•"/>
-              <a:defRPr sz="1800" kern="1200">
-                <a:solidFill>
-                  <a:schemeClr val="tx1"/>
-                </a:solidFill>
-                <a:latin typeface="+mn-lt"/>
-                <a:ea typeface="+mn-ea"/>
-                <a:cs typeface="+mn-cs"/>
-              </a:defRPr>
-            </a:lvl8pPr>
-            <a:lvl9pPr marL="3886200" indent="-228600" algn="l" defTabSz="914400" rtl="0" eaLnBrk="1" latinLnBrk="0" hangingPunct="1">
-              <a:lnSpc>
-                <a:spcPct val="90000"/>
-              </a:lnSpc>
-              <a:spcBef>
-                <a:spcPts val="500"/>
-              </a:spcBef>
-              <a:buFont typeface="Arial" panose="020B0604020202020204" pitchFamily="34" charset="0"/>
-              <a:buChar char="•"/>
-              <a:defRPr sz="1800" kern="1200">
-                <a:solidFill>
-                  <a:schemeClr val="tx1"/>
-                </a:solidFill>
-                <a:latin typeface="+mn-lt"/>
-                <a:ea typeface="+mn-ea"/>
-                <a:cs typeface="+mn-cs"/>
-              </a:defRPr>
-            </a:lvl9pPr>
-          </a:lstStyle>
-          <a:p>
-            <a:r>
-              <a:rPr lang="zh-CN" altLang="en-US" dirty="0">
-                <a:latin typeface="+mn-ea"/>
-              </a:rPr>
-              <a:t>万字工作文档，详细记录问题解决过程</a:t>
-            </a:r>
-            <a:endParaRPr lang="en-US" altLang="zh-CN" dirty="0">
-              <a:latin typeface="+mn-ea"/>
-            </a:endParaRPr>
-          </a:p>
-          <a:p>
-            <a:r>
-              <a:rPr lang="en-US" altLang="zh-CN" dirty="0">
-                <a:latin typeface="+mn-ea"/>
-              </a:rPr>
-              <a:t>5k</a:t>
-            </a:r>
-            <a:r>
-              <a:rPr lang="zh-CN" altLang="en-US" dirty="0">
-                <a:latin typeface="+mn-ea"/>
-              </a:rPr>
-              <a:t>字</a:t>
-            </a:r>
-            <a:r>
-              <a:rPr lang="en-US" altLang="zh-CN" dirty="0" err="1">
-                <a:latin typeface="+mn-ea"/>
-              </a:rPr>
-              <a:t>qemu</a:t>
-            </a:r>
-            <a:r>
-              <a:rPr lang="en-US" altLang="zh-CN" dirty="0">
-                <a:latin typeface="+mn-ea"/>
-              </a:rPr>
-              <a:t>-tutorial</a:t>
-            </a:r>
-            <a:r>
-              <a:rPr lang="zh-CN" altLang="en-US" dirty="0">
-                <a:latin typeface="+mn-ea"/>
-              </a:rPr>
-              <a:t>，代码级</a:t>
-            </a:r>
-            <a:r>
-              <a:rPr lang="en-US" altLang="zh-CN" dirty="0" err="1">
-                <a:latin typeface="+mn-ea"/>
-              </a:rPr>
-              <a:t>qemu</a:t>
-            </a:r>
-            <a:r>
-              <a:rPr lang="zh-CN" altLang="en-US" dirty="0">
-                <a:latin typeface="+mn-ea"/>
-              </a:rPr>
-              <a:t>教程</a:t>
-            </a:r>
-            <a:endParaRPr lang="en-US" altLang="zh-CN" dirty="0">
-              <a:latin typeface="+mn-ea"/>
-            </a:endParaRPr>
-          </a:p>
-          <a:p>
-            <a:r>
-              <a:rPr lang="zh-CN" altLang="en-US" dirty="0">
-                <a:latin typeface="+mn-ea"/>
-              </a:rPr>
-              <a:t>每周展示</a:t>
-            </a:r>
-            <a:r>
-              <a:rPr lang="en-US" altLang="zh-CN" dirty="0">
-                <a:latin typeface="+mn-ea"/>
-              </a:rPr>
-              <a:t>ppt</a:t>
-            </a:r>
-            <a:r>
-              <a:rPr lang="zh-CN" altLang="en-US" dirty="0">
-                <a:latin typeface="+mn-ea"/>
-              </a:rPr>
-              <a:t>，周工作记录</a:t>
-            </a:r>
-            <a:endParaRPr lang="en-US" altLang="zh-CN" dirty="0">
-              <a:latin typeface="+mn-ea"/>
-            </a:endParaRPr>
-          </a:p>
-          <a:p>
-            <a:r>
-              <a:rPr lang="zh-CN" altLang="en-US" dirty="0">
-                <a:latin typeface="+mn-ea"/>
-              </a:rPr>
-              <a:t>更多的</a:t>
-            </a:r>
-            <a:r>
-              <a:rPr lang="en-US" altLang="zh-CN" dirty="0">
-                <a:latin typeface="+mn-ea"/>
-              </a:rPr>
-              <a:t>debug</a:t>
-            </a:r>
-            <a:r>
-              <a:rPr lang="zh-CN" altLang="en-US" dirty="0">
-                <a:latin typeface="+mn-ea"/>
-              </a:rPr>
-              <a:t>过程</a:t>
-            </a:r>
-            <a:r>
-              <a:rPr lang="en-US" altLang="zh-CN" dirty="0">
-                <a:latin typeface="+mn-ea"/>
-              </a:rPr>
-              <a:t>……</a:t>
-            </a:r>
-            <a:endParaRPr lang="en-US" altLang="zh-CN" dirty="0">
-              <a:latin typeface="+mn-ea"/>
-            </a:endParaRPr>
-          </a:p>
-        </p:txBody>
-      </p:sp>
+          <a:lstStyle/>
+          <a:p>
+            <a:r>
+              <a:rPr lang="zh-CN" altLang="en-US"/>
+              <a:t>上：</a:t>
+            </a:r>
+            <a:r>
+              <a:rPr lang="en-US" altLang="zh-CN"/>
+              <a:t>uintr</a:t>
+            </a:r>
+            <a:r>
+              <a:rPr lang="zh-CN" altLang="en-US"/>
+              <a:t>；下：</a:t>
+            </a:r>
+            <a:r>
+              <a:rPr lang="en-US" altLang="zh-CN"/>
+              <a:t>domain</a:t>
+            </a:r>
+          </a:p>
+        </p:txBody>
+      </p:sp>
+      <p:pic>
+        <p:nvPicPr>
+          <p:cNvPr id="3" name="图片 2"/>
+          <p:cNvPicPr>
+            <a:picLocks noChangeAspect="1"/>
+          </p:cNvPicPr>
+          <p:nvPr/>
+        </p:nvPicPr>
+        <p:blipFill>
+          <a:blip r:embed="rId6"/>
+          <a:stretch>
+            <a:fillRect/>
+          </a:stretch>
+        </p:blipFill>
+        <p:spPr>
+          <a:xfrm>
+            <a:off x="7146290" y="4561205"/>
+            <a:ext cx="3918585" cy="2085975"/>
+          </a:xfrm>
+          <a:prstGeom prst="rect">
+            <a:avLst/>
+          </a:prstGeom>
+        </p:spPr>
+      </p:pic>
     </p:spTree>
   </p:cSld>
   <p:clrMapOvr>
@@ -7393,7 +7351,7 @@
                 <a:latin typeface="思源宋体 Medium" panose="02020500000000000000" pitchFamily="18" charset="-122"/>
                 <a:ea typeface="思源宋体 Medium" panose="02020500000000000000" pitchFamily="18" charset="-122"/>
               </a:rPr>
-              <a:t>感想</a:t>
+              <a:t>工作过程管理</a:t>
             </a:r>
             <a:endParaRPr lang="en-US" altLang="zh-CN" sz="4000" b="1" dirty="0">
               <a:solidFill>
@@ -7460,7 +7418,7 @@
           <p:nvPr/>
         </p:nvPicPr>
         <p:blipFill>
-          <a:blip r:embed="rId1">
+          <a:blip r:embed="rId3">
             <a:clrChange>
               <a:clrFrom>
                 <a:srgbClr val="FFFFFF"/>
@@ -7880,8 +7838,8 @@
         </p:nvSpPr>
         <p:spPr>
           <a:xfrm>
-            <a:off x="1113790" y="1758950"/>
-            <a:ext cx="10515600" cy="3631565"/>
+            <a:off x="1113971" y="1758689"/>
+            <a:ext cx="6954264" cy="2174628"/>
           </a:xfrm>
           <a:prstGeom prst="rect">
             <a:avLst/>
@@ -8056,74 +8014,111 @@
             </a:lvl9pPr>
           </a:lstStyle>
           <a:p>
-            <a:pPr marL="0" indent="0">
-              <a:buNone/>
-            </a:pPr>
+            <a:r>
+              <a:rPr lang="zh-CN" altLang="en-US" dirty="0">
+                <a:latin typeface="+mn-ea"/>
+              </a:rPr>
+              <a:t>万字工作文档，详细记录问题解决过程</a:t>
+            </a:r>
+            <a:endParaRPr lang="en-US" altLang="zh-CN" dirty="0">
+              <a:latin typeface="+mn-ea"/>
+            </a:endParaRPr>
+          </a:p>
+          <a:p>
+            <a:r>
+              <a:rPr lang="en-US" altLang="zh-CN" dirty="0">
+                <a:latin typeface="+mn-ea"/>
+              </a:rPr>
+              <a:t>5k</a:t>
+            </a:r>
+            <a:r>
+              <a:rPr lang="zh-CN" altLang="en-US" dirty="0">
+                <a:latin typeface="+mn-ea"/>
+              </a:rPr>
+              <a:t>字</a:t>
+            </a:r>
             <a:r>
               <a:rPr lang="en-US" altLang="zh-CN" dirty="0" err="1">
                 <a:latin typeface="+mn-ea"/>
               </a:rPr>
-              <a:t>Xcd</a:t>
+              <a:t>qemu</a:t>
+            </a:r>
+            <a:r>
+              <a:rPr lang="en-US" altLang="zh-CN" dirty="0">
+                <a:latin typeface="+mn-ea"/>
+              </a:rPr>
+              <a:t>-tutorial</a:t>
             </a:r>
             <a:r>
               <a:rPr lang="zh-CN" altLang="en-US" dirty="0">
                 <a:latin typeface="+mn-ea"/>
               </a:rPr>
-              <a:t>：从硬件</a:t>
+              <a:t>，代码级</a:t>
+            </a:r>
+            <a:r>
+              <a:rPr lang="en-US" altLang="zh-CN" dirty="0" err="1">
+                <a:latin typeface="+mn-ea"/>
+              </a:rPr>
+              <a:t>qemu</a:t>
+            </a:r>
+            <a:r>
+              <a:rPr lang="zh-CN" altLang="en-US" dirty="0">
+                <a:latin typeface="+mn-ea"/>
+              </a:rPr>
+              <a:t>教程</a:t>
+            </a:r>
+            <a:endParaRPr lang="en-US" altLang="zh-CN" dirty="0">
+              <a:latin typeface="+mn-ea"/>
+            </a:endParaRPr>
+          </a:p>
+          <a:p>
+            <a:r>
+              <a:rPr lang="zh-CN" altLang="en-US" dirty="0">
+                <a:latin typeface="+mn-ea"/>
+              </a:rPr>
+              <a:t>每周展示</a:t>
             </a:r>
             <a:r>
               <a:rPr lang="en-US" altLang="zh-CN" dirty="0">
                 <a:latin typeface="+mn-ea"/>
               </a:rPr>
-              <a:t>-</a:t>
+              <a:t>ppt</a:t>
             </a:r>
             <a:r>
               <a:rPr lang="zh-CN" altLang="en-US" dirty="0">
                 <a:latin typeface="+mn-ea"/>
               </a:rPr>
-              <a:t>操作系统</a:t>
+              <a:t>，周工作记录</a:t>
+            </a:r>
+            <a:endParaRPr lang="en-US" altLang="zh-CN" dirty="0">
+              <a:latin typeface="+mn-ea"/>
+            </a:endParaRPr>
+          </a:p>
+          <a:p>
+            <a:r>
+              <a:rPr lang="zh-CN" altLang="en-US" dirty="0">
+                <a:latin typeface="+mn-ea"/>
+              </a:rPr>
+              <a:t>更多的</a:t>
             </a:r>
             <a:r>
               <a:rPr lang="en-US" altLang="zh-CN" dirty="0">
                 <a:latin typeface="+mn-ea"/>
               </a:rPr>
-              <a:t>-</a:t>
+              <a:t>debug</a:t>
             </a:r>
             <a:r>
               <a:rPr lang="zh-CN" altLang="en-US" dirty="0">
                 <a:latin typeface="+mn-ea"/>
               </a:rPr>
-              <a:t>用户程序的全流程调试体验，和学长、社区的讨论、对</a:t>
+              <a:t>过程</a:t>
             </a:r>
             <a:r>
               <a:rPr lang="en-US" altLang="zh-CN" dirty="0">
                 <a:latin typeface="+mn-ea"/>
               </a:rPr>
-              <a:t>x</a:t>
-            </a:r>
-            <a:endParaRPr lang="en-US" altLang="zh-CN" dirty="0">
-              <a:latin typeface="+mn-ea"/>
-            </a:endParaRPr>
-          </a:p>
-          <a:p>
-            <a:pPr marL="0" indent="0">
-              <a:buNone/>
-            </a:pPr>
-            <a:r>
-              <a:rPr lang="en-US" altLang="zh-CN" dirty="0">
-                <a:latin typeface="+mn-ea"/>
-              </a:rPr>
-              <a:t>Sx</a:t>
-            </a:r>
-            <a:r>
-              <a:rPr lang="zh-CN" altLang="en-US" dirty="0">
-                <a:latin typeface="+mn-ea"/>
-              </a:rPr>
-              <a:t>：很喜欢现代调试工具，打断点看变量很舒服</a:t>
-            </a:r>
-            <a:endParaRPr lang="zh-CN" altLang="en-US" dirty="0">
-              <a:latin typeface="+mn-ea"/>
-            </a:endParaRPr>
+              <a:t>……</a:t>
+            </a:r>
           </a:p>
         </p:txBody>
       </p:sp>
@@ -8154,14 +8149,14 @@
       </p:grpSpPr>
       <p:sp>
         <p:nvSpPr>
-          <p:cNvPr id="10" name="内容占位符 2"/>
+          <p:cNvPr id="11" name="标题 1"/>
           <p:cNvSpPr txBox="1"/>
           <p:nvPr/>
         </p:nvSpPr>
         <p:spPr>
           <a:xfrm>
-            <a:off x="880106" y="2024290"/>
-            <a:ext cx="10395795" cy="4152673"/>
+            <a:off x="1170269" y="797307"/>
+            <a:ext cx="10030487" cy="961382"/>
           </a:xfrm>
           <a:prstGeom prst="rect">
             <a:avLst/>
@@ -8170,255 +8165,101 @@
         <p:txBody>
           <a:bodyPr/>
           <a:lstStyle>
-            <a:lvl1pPr marL="228600" indent="-228600" algn="l" defTabSz="914400" rtl="0" eaLnBrk="1" latinLnBrk="0" hangingPunct="1">
-              <a:lnSpc>
-                <a:spcPct val="90000"/>
-              </a:lnSpc>
-              <a:spcBef>
-                <a:spcPts val="1000"/>
-              </a:spcBef>
-              <a:buFont typeface="Arial" panose="020B0604020202020204" pitchFamily="34" charset="0"/>
-              <a:buChar char="•"/>
-              <a:defRPr sz="2800" kern="1200">
-                <a:solidFill>
-                  <a:schemeClr val="tx1"/>
-                </a:solidFill>
-                <a:latin typeface="+mn-lt"/>
-                <a:ea typeface="+mn-ea"/>
-                <a:cs typeface="+mn-cs"/>
+            <a:lvl1pPr algn="l" defTabSz="914400" rtl="0" eaLnBrk="1" latinLnBrk="0" hangingPunct="1">
+              <a:lnSpc>
+                <a:spcPct val="90000"/>
+              </a:lnSpc>
+              <a:spcBef>
+                <a:spcPct val="0"/>
+              </a:spcBef>
+              <a:buNone/>
+              <a:defRPr sz="4400" kern="1200">
+                <a:solidFill>
+                  <a:schemeClr val="tx1"/>
+                </a:solidFill>
+                <a:latin typeface="+mj-lt"/>
+                <a:ea typeface="+mj-ea"/>
+                <a:cs typeface="+mj-cs"/>
               </a:defRPr>
             </a:lvl1pPr>
-            <a:lvl2pPr marL="685800" indent="-228600" algn="l" defTabSz="914400" rtl="0" eaLnBrk="1" latinLnBrk="0" hangingPunct="1">
-              <a:lnSpc>
-                <a:spcPct val="90000"/>
-              </a:lnSpc>
-              <a:spcBef>
-                <a:spcPts val="500"/>
-              </a:spcBef>
-              <a:buFont typeface="Arial" panose="020B0604020202020204" pitchFamily="34" charset="0"/>
-              <a:buChar char="•"/>
-              <a:defRPr sz="2400" kern="1200">
-                <a:solidFill>
-                  <a:schemeClr val="tx1"/>
-                </a:solidFill>
-                <a:latin typeface="+mn-lt"/>
-                <a:ea typeface="+mn-ea"/>
-                <a:cs typeface="+mn-cs"/>
-              </a:defRPr>
-            </a:lvl2pPr>
-            <a:lvl3pPr marL="1143000" indent="-228600" algn="l" defTabSz="914400" rtl="0" eaLnBrk="1" latinLnBrk="0" hangingPunct="1">
-              <a:lnSpc>
-                <a:spcPct val="90000"/>
-              </a:lnSpc>
-              <a:spcBef>
-                <a:spcPts val="500"/>
-              </a:spcBef>
-              <a:buFont typeface="Arial" panose="020B0604020202020204" pitchFamily="34" charset="0"/>
-              <a:buChar char="•"/>
-              <a:defRPr sz="2000" kern="1200">
-                <a:solidFill>
-                  <a:schemeClr val="tx1"/>
-                </a:solidFill>
-                <a:latin typeface="+mn-lt"/>
-                <a:ea typeface="+mn-ea"/>
-                <a:cs typeface="+mn-cs"/>
-              </a:defRPr>
-            </a:lvl3pPr>
-            <a:lvl4pPr marL="1600200" indent="-228600" algn="l" defTabSz="914400" rtl="0" eaLnBrk="1" latinLnBrk="0" hangingPunct="1">
-              <a:lnSpc>
-                <a:spcPct val="90000"/>
-              </a:lnSpc>
-              <a:spcBef>
-                <a:spcPts val="500"/>
-              </a:spcBef>
-              <a:buFont typeface="Arial" panose="020B0604020202020204" pitchFamily="34" charset="0"/>
-              <a:buChar char="•"/>
-              <a:defRPr sz="1800" kern="1200">
-                <a:solidFill>
-                  <a:schemeClr val="tx1"/>
-                </a:solidFill>
-                <a:latin typeface="+mn-lt"/>
-                <a:ea typeface="+mn-ea"/>
-                <a:cs typeface="+mn-cs"/>
-              </a:defRPr>
-            </a:lvl4pPr>
-            <a:lvl5pPr marL="2057400" indent="-228600" algn="l" defTabSz="914400" rtl="0" eaLnBrk="1" latinLnBrk="0" hangingPunct="1">
-              <a:lnSpc>
-                <a:spcPct val="90000"/>
-              </a:lnSpc>
-              <a:spcBef>
-                <a:spcPts val="500"/>
-              </a:spcBef>
-              <a:buFont typeface="Arial" panose="020B0604020202020204" pitchFamily="34" charset="0"/>
-              <a:buChar char="•"/>
-              <a:defRPr sz="1800" kern="1200">
-                <a:solidFill>
-                  <a:schemeClr val="tx1"/>
-                </a:solidFill>
-                <a:latin typeface="+mn-lt"/>
-                <a:ea typeface="+mn-ea"/>
-                <a:cs typeface="+mn-cs"/>
-              </a:defRPr>
-            </a:lvl5pPr>
-            <a:lvl6pPr marL="2514600" indent="-228600" algn="l" defTabSz="914400" rtl="0" eaLnBrk="1" latinLnBrk="0" hangingPunct="1">
-              <a:lnSpc>
-                <a:spcPct val="90000"/>
-              </a:lnSpc>
-              <a:spcBef>
-                <a:spcPts val="500"/>
-              </a:spcBef>
-              <a:buFont typeface="Arial" panose="020B0604020202020204" pitchFamily="34" charset="0"/>
-              <a:buChar char="•"/>
-              <a:defRPr sz="1800" kern="1200">
-                <a:solidFill>
-                  <a:schemeClr val="tx1"/>
-                </a:solidFill>
-                <a:latin typeface="+mn-lt"/>
-                <a:ea typeface="+mn-ea"/>
-                <a:cs typeface="+mn-cs"/>
-              </a:defRPr>
-            </a:lvl6pPr>
-            <a:lvl7pPr marL="2971800" indent="-228600" algn="l" defTabSz="914400" rtl="0" eaLnBrk="1" latinLnBrk="0" hangingPunct="1">
-              <a:lnSpc>
-                <a:spcPct val="90000"/>
-              </a:lnSpc>
-              <a:spcBef>
-                <a:spcPts val="500"/>
-              </a:spcBef>
-              <a:buFont typeface="Arial" panose="020B0604020202020204" pitchFamily="34" charset="0"/>
-              <a:buChar char="•"/>
-              <a:defRPr sz="1800" kern="1200">
-                <a:solidFill>
-                  <a:schemeClr val="tx1"/>
-                </a:solidFill>
-                <a:latin typeface="+mn-lt"/>
-                <a:ea typeface="+mn-ea"/>
-                <a:cs typeface="+mn-cs"/>
-              </a:defRPr>
-            </a:lvl7pPr>
-            <a:lvl8pPr marL="3429000" indent="-228600" algn="l" defTabSz="914400" rtl="0" eaLnBrk="1" latinLnBrk="0" hangingPunct="1">
-              <a:lnSpc>
-                <a:spcPct val="90000"/>
-              </a:lnSpc>
-              <a:spcBef>
-                <a:spcPts val="500"/>
-              </a:spcBef>
-              <a:buFont typeface="Arial" panose="020B0604020202020204" pitchFamily="34" charset="0"/>
-              <a:buChar char="•"/>
-              <a:defRPr sz="1800" kern="1200">
-                <a:solidFill>
-                  <a:schemeClr val="tx1"/>
-                </a:solidFill>
-                <a:latin typeface="+mn-lt"/>
-                <a:ea typeface="+mn-ea"/>
-                <a:cs typeface="+mn-cs"/>
-              </a:defRPr>
-            </a:lvl8pPr>
-            <a:lvl9pPr marL="3886200" indent="-228600" algn="l" defTabSz="914400" rtl="0" eaLnBrk="1" latinLnBrk="0" hangingPunct="1">
-              <a:lnSpc>
-                <a:spcPct val="90000"/>
-              </a:lnSpc>
-              <a:spcBef>
-                <a:spcPts val="500"/>
-              </a:spcBef>
-              <a:buFont typeface="Arial" panose="020B0604020202020204" pitchFamily="34" charset="0"/>
-              <a:buChar char="•"/>
-              <a:defRPr sz="1800" kern="1200">
-                <a:solidFill>
-                  <a:schemeClr val="tx1"/>
-                </a:solidFill>
-                <a:latin typeface="+mn-lt"/>
-                <a:ea typeface="+mn-ea"/>
-                <a:cs typeface="+mn-cs"/>
-              </a:defRPr>
-            </a:lvl9pPr>
           </a:lstStyle>
           <a:p>
-            <a:pPr marL="0" indent="0">
-              <a:buNone/>
-            </a:pPr>
-            <a:endParaRPr kumimoji="1" lang="zh-CN" altLang="en-US" dirty="0">
-              <a:solidFill>
-                <a:srgbClr val="FF0000"/>
-              </a:solidFill>
-            </a:endParaRPr>
-          </a:p>
-          <a:p>
-            <a:pPr marL="0" indent="0">
-              <a:buNone/>
-            </a:pPr>
-            <a:endParaRPr kumimoji="1" lang="zh-CN" altLang="en-US" dirty="0">
-              <a:solidFill>
-                <a:srgbClr val="FF0000"/>
-              </a:solidFill>
-            </a:endParaRPr>
-          </a:p>
-          <a:p>
-            <a:pPr marL="0" indent="0" algn="ctr">
-              <a:buNone/>
-            </a:pPr>
-            <a:r>
-              <a:rPr kumimoji="1" lang="zh-CN" altLang="en-US" sz="3600" dirty="0">
+            <a:r>
+              <a:rPr lang="zh-CN" altLang="en-US" sz="4000" b="1" dirty="0">
                 <a:solidFill>
                   <a:srgbClr val="704F95"/>
                 </a:solidFill>
-                <a:latin typeface="思源宋体 Heavy" panose="02020900000000000000" pitchFamily="18" charset="-122"/>
-                <a:ea typeface="思源宋体 Heavy" panose="02020900000000000000" pitchFamily="18" charset="-122"/>
+                <a:latin typeface="思源宋体 Medium" panose="02020500000000000000" pitchFamily="18" charset="-122"/>
+                <a:ea typeface="思源宋体 Medium" panose="02020500000000000000" pitchFamily="18" charset="-122"/>
               </a:rPr>
-              <a:t>感谢陈渝老师和向勇老师的指导！</a:t>
-            </a:r>
-            <a:endParaRPr kumimoji="1" lang="en-US" altLang="zh-CN" sz="3600" dirty="0">
+              <a:t>感想</a:t>
+            </a:r>
+            <a:endParaRPr lang="en-US" altLang="zh-CN" sz="4000" b="1" dirty="0">
               <a:solidFill>
                 <a:srgbClr val="704F95"/>
               </a:solidFill>
-              <a:latin typeface="思源宋体 Heavy" panose="02020900000000000000" pitchFamily="18" charset="-122"/>
-              <a:ea typeface="思源宋体 Heavy" panose="02020900000000000000" pitchFamily="18" charset="-122"/>
+              <a:latin typeface="思源宋体 Medium" panose="02020500000000000000" pitchFamily="18" charset="-122"/>
+              <a:ea typeface="思源宋体 Medium" panose="02020500000000000000" pitchFamily="18" charset="-122"/>
             </a:endParaRPr>
           </a:p>
-          <a:p>
-            <a:pPr marL="0" indent="0" algn="ctr">
-              <a:buNone/>
-            </a:pPr>
-            <a:r>
-              <a:rPr kumimoji="1" lang="zh-CN" altLang="en-US" sz="3600" dirty="0">
-                <a:solidFill>
-                  <a:srgbClr val="704F95"/>
-                </a:solidFill>
-                <a:latin typeface="思源宋体 Heavy" panose="02020900000000000000" pitchFamily="18" charset="-122"/>
-                <a:ea typeface="思源宋体 Heavy" panose="02020900000000000000" pitchFamily="18" charset="-122"/>
+        </p:txBody>
+      </p:sp>
+      <p:sp>
+        <p:nvSpPr>
+          <p:cNvPr id="43" name="Rectangle 236"/>
+          <p:cNvSpPr/>
+          <p:nvPr/>
+        </p:nvSpPr>
+        <p:spPr>
+          <a:xfrm>
+            <a:off x="987616" y="797307"/>
+            <a:ext cx="10395795" cy="923330"/>
+          </a:xfrm>
+          <a:prstGeom prst="rect">
+            <a:avLst/>
+          </a:prstGeom>
+          <a:noFill/>
+        </p:spPr>
+        <p:txBody>
+          <a:bodyPr wrap="none" lIns="91440" tIns="45720" rIns="91440" bIns="45720">
+            <a:spAutoFit/>
+            <a:scene3d>
+              <a:camera prst="orthographicFront"/>
+              <a:lightRig rig="soft" dir="t">
+                <a:rot lat="0" lon="0" rev="15600000"/>
+              </a:lightRig>
+            </a:scene3d>
+            <a:sp3d extrusionH="57150" prstMaterial="softEdge">
+              <a:bevelT w="25400" h="38100"/>
+            </a:sp3d>
+          </a:bodyPr>
+          <a:lstStyle/>
+          <a:p>
+            <a:pPr algn="ctr"/>
+            <a:r>
+              <a:rPr lang="zh-CN" altLang="en-US" sz="5400" b="1" u="sng" dirty="0">
+                <a:solidFill>
+                  <a:srgbClr val="803A87"/>
+                </a:solidFill>
               </a:rPr>
-              <a:t>感谢贾越凯、贺鲲鹏、尤予阳以及其他学长的帮助！</a:t>
-            </a:r>
-            <a:endParaRPr kumimoji="1" lang="en-US" altLang="zh-CN" sz="3600" dirty="0">
+              <a:t>                                                               </a:t>
+            </a:r>
+            <a:endParaRPr lang="en-US" altLang="zh-CN" sz="5400" b="1" u="sng" dirty="0">
               <a:solidFill>
-                <a:srgbClr val="704F95"/>
+                <a:srgbClr val="803A87"/>
               </a:solidFill>
-              <a:latin typeface="思源宋体 Heavy" panose="02020900000000000000" pitchFamily="18" charset="-122"/>
-              <a:ea typeface="思源宋体 Heavy" panose="02020900000000000000" pitchFamily="18" charset="-122"/>
-            </a:endParaRPr>
-          </a:p>
-          <a:p>
-            <a:pPr marL="0" indent="0" algn="ctr">
-              <a:buNone/>
-            </a:pPr>
-            <a:endParaRPr kumimoji="1" lang="en-US" altLang="zh-CN" sz="3600" dirty="0">
-              <a:solidFill>
-                <a:srgbClr val="704F95"/>
-              </a:solidFill>
-              <a:latin typeface="思源宋体 Heavy" panose="02020900000000000000" pitchFamily="18" charset="-122"/>
-              <a:ea typeface="思源宋体 Heavy" panose="02020900000000000000" pitchFamily="18" charset="-122"/>
             </a:endParaRPr>
           </a:p>
         </p:txBody>
       </p:sp>
       <p:pic>
         <p:nvPicPr>
-          <p:cNvPr id="8" name="Picture 8"/>
+          <p:cNvPr id="44" name="Picture 8"/>
           <p:cNvPicPr/>
           <p:nvPr/>
         </p:nvPicPr>
         <p:blipFill>
-          <a:blip r:embed="rId1">
+          <a:blip r:embed="rId3">
             <a:clrChange>
               <a:clrFrom>
                 <a:srgbClr val="FFFFFF"/>
@@ -8446,6 +8287,958 @@
       </p:pic>
       <p:sp>
         <p:nvSpPr>
+          <p:cNvPr id="8" name="文本占位符 1"/>
+          <p:cNvSpPr txBox="1"/>
+          <p:nvPr/>
+        </p:nvSpPr>
+        <p:spPr>
+          <a:xfrm>
+            <a:off x="6371771" y="263796"/>
+            <a:ext cx="5629085" cy="328059"/>
+          </a:xfrm>
+          <a:prstGeom prst="rect">
+            <a:avLst/>
+          </a:prstGeom>
+          <a:ln w="12700" cmpd="sng">
+            <a:noFill/>
+          </a:ln>
+        </p:spPr>
+        <p:txBody>
+          <a:bodyPr vert="horz" anchor="ctr"/>
+          <a:lstStyle>
+            <a:lvl1pPr marL="0" indent="0" algn="l" defTabSz="914400" rtl="0" eaLnBrk="1" latinLnBrk="0" hangingPunct="1">
+              <a:lnSpc>
+                <a:spcPct val="90000"/>
+              </a:lnSpc>
+              <a:spcBef>
+                <a:spcPts val="1000"/>
+              </a:spcBef>
+              <a:buFont typeface="Arial" panose="020B0604020202020204" pitchFamily="34" charset="0"/>
+              <a:buNone/>
+              <a:defRPr sz="1400" b="1" kern="1200">
+                <a:solidFill>
+                  <a:schemeClr val="tx1"/>
+                </a:solidFill>
+                <a:latin typeface="微软雅黑" charset="0"/>
+                <a:ea typeface="微软雅黑" charset="0"/>
+                <a:cs typeface="微软雅黑" charset="0"/>
+              </a:defRPr>
+            </a:lvl1pPr>
+            <a:lvl2pPr marL="685800" indent="-228600" algn="l" defTabSz="914400" rtl="0" eaLnBrk="1" latinLnBrk="0" hangingPunct="1">
+              <a:lnSpc>
+                <a:spcPct val="90000"/>
+              </a:lnSpc>
+              <a:spcBef>
+                <a:spcPts val="500"/>
+              </a:spcBef>
+              <a:buFont typeface="Arial" panose="020B0604020202020204" pitchFamily="34" charset="0"/>
+              <a:buChar char="•"/>
+              <a:defRPr sz="2400" kern="1200">
+                <a:solidFill>
+                  <a:schemeClr val="tx1"/>
+                </a:solidFill>
+                <a:latin typeface="+mn-lt"/>
+                <a:ea typeface="+mn-ea"/>
+                <a:cs typeface="+mn-cs"/>
+              </a:defRPr>
+            </a:lvl2pPr>
+            <a:lvl3pPr marL="1143000" indent="-228600" algn="l" defTabSz="914400" rtl="0" eaLnBrk="1" latinLnBrk="0" hangingPunct="1">
+              <a:lnSpc>
+                <a:spcPct val="90000"/>
+              </a:lnSpc>
+              <a:spcBef>
+                <a:spcPts val="500"/>
+              </a:spcBef>
+              <a:buFont typeface="Arial" panose="020B0604020202020204" pitchFamily="34" charset="0"/>
+              <a:buChar char="•"/>
+              <a:defRPr sz="2000" kern="1200">
+                <a:solidFill>
+                  <a:schemeClr val="tx1"/>
+                </a:solidFill>
+                <a:latin typeface="+mn-lt"/>
+                <a:ea typeface="+mn-ea"/>
+                <a:cs typeface="+mn-cs"/>
+              </a:defRPr>
+            </a:lvl3pPr>
+            <a:lvl4pPr marL="1600200" indent="-228600" algn="l" defTabSz="914400" rtl="0" eaLnBrk="1" latinLnBrk="0" hangingPunct="1">
+              <a:lnSpc>
+                <a:spcPct val="90000"/>
+              </a:lnSpc>
+              <a:spcBef>
+                <a:spcPts val="500"/>
+              </a:spcBef>
+              <a:buFont typeface="Arial" panose="020B0604020202020204" pitchFamily="34" charset="0"/>
+              <a:buChar char="•"/>
+              <a:defRPr sz="1800" kern="1200">
+                <a:solidFill>
+                  <a:schemeClr val="tx1"/>
+                </a:solidFill>
+                <a:latin typeface="+mn-lt"/>
+                <a:ea typeface="+mn-ea"/>
+                <a:cs typeface="+mn-cs"/>
+              </a:defRPr>
+            </a:lvl4pPr>
+            <a:lvl5pPr marL="2057400" indent="-228600" algn="l" defTabSz="914400" rtl="0" eaLnBrk="1" latinLnBrk="0" hangingPunct="1">
+              <a:lnSpc>
+                <a:spcPct val="90000"/>
+              </a:lnSpc>
+              <a:spcBef>
+                <a:spcPts val="500"/>
+              </a:spcBef>
+              <a:buFont typeface="Arial" panose="020B0604020202020204" pitchFamily="34" charset="0"/>
+              <a:buChar char="•"/>
+              <a:defRPr sz="1800" kern="1200">
+                <a:solidFill>
+                  <a:schemeClr val="tx1"/>
+                </a:solidFill>
+                <a:latin typeface="+mn-lt"/>
+                <a:ea typeface="+mn-ea"/>
+                <a:cs typeface="+mn-cs"/>
+              </a:defRPr>
+            </a:lvl5pPr>
+            <a:lvl6pPr marL="2514600" indent="-228600" algn="l" defTabSz="914400" rtl="0" eaLnBrk="1" latinLnBrk="0" hangingPunct="1">
+              <a:lnSpc>
+                <a:spcPct val="90000"/>
+              </a:lnSpc>
+              <a:spcBef>
+                <a:spcPts val="500"/>
+              </a:spcBef>
+              <a:buFont typeface="Arial" panose="020B0604020202020204" pitchFamily="34" charset="0"/>
+              <a:buChar char="•"/>
+              <a:defRPr sz="1800" kern="1200">
+                <a:solidFill>
+                  <a:schemeClr val="tx1"/>
+                </a:solidFill>
+                <a:latin typeface="+mn-lt"/>
+                <a:ea typeface="+mn-ea"/>
+                <a:cs typeface="+mn-cs"/>
+              </a:defRPr>
+            </a:lvl6pPr>
+            <a:lvl7pPr marL="2971800" indent="-228600" algn="l" defTabSz="914400" rtl="0" eaLnBrk="1" latinLnBrk="0" hangingPunct="1">
+              <a:lnSpc>
+                <a:spcPct val="90000"/>
+              </a:lnSpc>
+              <a:spcBef>
+                <a:spcPts val="500"/>
+              </a:spcBef>
+              <a:buFont typeface="Arial" panose="020B0604020202020204" pitchFamily="34" charset="0"/>
+              <a:buChar char="•"/>
+              <a:defRPr sz="1800" kern="1200">
+                <a:solidFill>
+                  <a:schemeClr val="tx1"/>
+                </a:solidFill>
+                <a:latin typeface="+mn-lt"/>
+                <a:ea typeface="+mn-ea"/>
+                <a:cs typeface="+mn-cs"/>
+              </a:defRPr>
+            </a:lvl7pPr>
+            <a:lvl8pPr marL="3429000" indent="-228600" algn="l" defTabSz="914400" rtl="0" eaLnBrk="1" latinLnBrk="0" hangingPunct="1">
+              <a:lnSpc>
+                <a:spcPct val="90000"/>
+              </a:lnSpc>
+              <a:spcBef>
+                <a:spcPts val="500"/>
+              </a:spcBef>
+              <a:buFont typeface="Arial" panose="020B0604020202020204" pitchFamily="34" charset="0"/>
+              <a:buChar char="•"/>
+              <a:defRPr sz="1800" kern="1200">
+                <a:solidFill>
+                  <a:schemeClr val="tx1"/>
+                </a:solidFill>
+                <a:latin typeface="+mn-lt"/>
+                <a:ea typeface="+mn-ea"/>
+                <a:cs typeface="+mn-cs"/>
+              </a:defRPr>
+            </a:lvl8pPr>
+            <a:lvl9pPr marL="3886200" indent="-228600" algn="l" defTabSz="914400" rtl="0" eaLnBrk="1" latinLnBrk="0" hangingPunct="1">
+              <a:lnSpc>
+                <a:spcPct val="90000"/>
+              </a:lnSpc>
+              <a:spcBef>
+                <a:spcPts val="500"/>
+              </a:spcBef>
+              <a:buFont typeface="Arial" panose="020B0604020202020204" pitchFamily="34" charset="0"/>
+              <a:buChar char="•"/>
+              <a:defRPr sz="1800" kern="1200">
+                <a:solidFill>
+                  <a:schemeClr val="tx1"/>
+                </a:solidFill>
+                <a:latin typeface="+mn-lt"/>
+                <a:ea typeface="+mn-ea"/>
+                <a:cs typeface="+mn-cs"/>
+              </a:defRPr>
+            </a:lvl9pPr>
+          </a:lstStyle>
+          <a:p>
+            <a:pPr algn="r"/>
+            <a:endParaRPr lang="en-US" altLang="zh-CN" dirty="0">
+              <a:solidFill>
+                <a:srgbClr val="704F95"/>
+              </a:solidFill>
+              <a:latin typeface="思源宋体 Medium" panose="02020500000000000000" pitchFamily="18" charset="-122"/>
+              <a:ea typeface="思源宋体 Medium" panose="02020500000000000000" pitchFamily="18" charset="-122"/>
+            </a:endParaRPr>
+          </a:p>
+        </p:txBody>
+      </p:sp>
+      <p:sp>
+        <p:nvSpPr>
+          <p:cNvPr id="6" name="Content Placeholder 2"/>
+          <p:cNvSpPr txBox="1"/>
+          <p:nvPr/>
+        </p:nvSpPr>
+        <p:spPr>
+          <a:xfrm>
+            <a:off x="1113971" y="1801282"/>
+            <a:ext cx="10515600" cy="4351338"/>
+          </a:xfrm>
+          <a:prstGeom prst="rect">
+            <a:avLst/>
+          </a:prstGeom>
+        </p:spPr>
+        <p:txBody>
+          <a:bodyPr>
+            <a:normAutofit/>
+          </a:bodyPr>
+          <a:lstStyle>
+            <a:lvl1pPr marL="228600" indent="-228600" algn="l" defTabSz="914400" rtl="0" eaLnBrk="1" latinLnBrk="0" hangingPunct="1">
+              <a:lnSpc>
+                <a:spcPct val="90000"/>
+              </a:lnSpc>
+              <a:spcBef>
+                <a:spcPts val="1000"/>
+              </a:spcBef>
+              <a:buFont typeface="Arial" panose="020B0604020202020204" pitchFamily="34" charset="0"/>
+              <a:buChar char="•"/>
+              <a:defRPr sz="2800" kern="1200">
+                <a:solidFill>
+                  <a:schemeClr val="tx1"/>
+                </a:solidFill>
+                <a:latin typeface="+mn-lt"/>
+                <a:ea typeface="+mn-ea"/>
+                <a:cs typeface="+mn-cs"/>
+              </a:defRPr>
+            </a:lvl1pPr>
+            <a:lvl2pPr marL="685800" indent="-228600" algn="l" defTabSz="914400" rtl="0" eaLnBrk="1" latinLnBrk="0" hangingPunct="1">
+              <a:lnSpc>
+                <a:spcPct val="90000"/>
+              </a:lnSpc>
+              <a:spcBef>
+                <a:spcPts val="500"/>
+              </a:spcBef>
+              <a:buFont typeface="Arial" panose="020B0604020202020204" pitchFamily="34" charset="0"/>
+              <a:buChar char="•"/>
+              <a:defRPr sz="2400" kern="1200">
+                <a:solidFill>
+                  <a:schemeClr val="tx1"/>
+                </a:solidFill>
+                <a:latin typeface="+mn-lt"/>
+                <a:ea typeface="+mn-ea"/>
+                <a:cs typeface="+mn-cs"/>
+              </a:defRPr>
+            </a:lvl2pPr>
+            <a:lvl3pPr marL="1143000" indent="-228600" algn="l" defTabSz="914400" rtl="0" eaLnBrk="1" latinLnBrk="0" hangingPunct="1">
+              <a:lnSpc>
+                <a:spcPct val="90000"/>
+              </a:lnSpc>
+              <a:spcBef>
+                <a:spcPts val="500"/>
+              </a:spcBef>
+              <a:buFont typeface="Arial" panose="020B0604020202020204" pitchFamily="34" charset="0"/>
+              <a:buChar char="•"/>
+              <a:defRPr sz="2000" kern="1200">
+                <a:solidFill>
+                  <a:schemeClr val="tx1"/>
+                </a:solidFill>
+                <a:latin typeface="+mn-lt"/>
+                <a:ea typeface="+mn-ea"/>
+                <a:cs typeface="+mn-cs"/>
+              </a:defRPr>
+            </a:lvl3pPr>
+            <a:lvl4pPr marL="1600200" indent="-228600" algn="l" defTabSz="914400" rtl="0" eaLnBrk="1" latinLnBrk="0" hangingPunct="1">
+              <a:lnSpc>
+                <a:spcPct val="90000"/>
+              </a:lnSpc>
+              <a:spcBef>
+                <a:spcPts val="500"/>
+              </a:spcBef>
+              <a:buFont typeface="Arial" panose="020B0604020202020204" pitchFamily="34" charset="0"/>
+              <a:buChar char="•"/>
+              <a:defRPr sz="1800" kern="1200">
+                <a:solidFill>
+                  <a:schemeClr val="tx1"/>
+                </a:solidFill>
+                <a:latin typeface="+mn-lt"/>
+                <a:ea typeface="+mn-ea"/>
+                <a:cs typeface="+mn-cs"/>
+              </a:defRPr>
+            </a:lvl4pPr>
+            <a:lvl5pPr marL="2057400" indent="-228600" algn="l" defTabSz="914400" rtl="0" eaLnBrk="1" latinLnBrk="0" hangingPunct="1">
+              <a:lnSpc>
+                <a:spcPct val="90000"/>
+              </a:lnSpc>
+              <a:spcBef>
+                <a:spcPts val="500"/>
+              </a:spcBef>
+              <a:buFont typeface="Arial" panose="020B0604020202020204" pitchFamily="34" charset="0"/>
+              <a:buChar char="•"/>
+              <a:defRPr sz="1800" kern="1200">
+                <a:solidFill>
+                  <a:schemeClr val="tx1"/>
+                </a:solidFill>
+                <a:latin typeface="+mn-lt"/>
+                <a:ea typeface="+mn-ea"/>
+                <a:cs typeface="+mn-cs"/>
+              </a:defRPr>
+            </a:lvl5pPr>
+            <a:lvl6pPr marL="2514600" indent="-228600" algn="l" defTabSz="914400" rtl="0" eaLnBrk="1" latinLnBrk="0" hangingPunct="1">
+              <a:lnSpc>
+                <a:spcPct val="90000"/>
+              </a:lnSpc>
+              <a:spcBef>
+                <a:spcPts val="500"/>
+              </a:spcBef>
+              <a:buFont typeface="Arial" panose="020B0604020202020204" pitchFamily="34" charset="0"/>
+              <a:buChar char="•"/>
+              <a:defRPr sz="1800" kern="1200">
+                <a:solidFill>
+                  <a:schemeClr val="tx1"/>
+                </a:solidFill>
+                <a:latin typeface="+mn-lt"/>
+                <a:ea typeface="+mn-ea"/>
+                <a:cs typeface="+mn-cs"/>
+              </a:defRPr>
+            </a:lvl6pPr>
+            <a:lvl7pPr marL="2971800" indent="-228600" algn="l" defTabSz="914400" rtl="0" eaLnBrk="1" latinLnBrk="0" hangingPunct="1">
+              <a:lnSpc>
+                <a:spcPct val="90000"/>
+              </a:lnSpc>
+              <a:spcBef>
+                <a:spcPts val="500"/>
+              </a:spcBef>
+              <a:buFont typeface="Arial" panose="020B0604020202020204" pitchFamily="34" charset="0"/>
+              <a:buChar char="•"/>
+              <a:defRPr sz="1800" kern="1200">
+                <a:solidFill>
+                  <a:schemeClr val="tx1"/>
+                </a:solidFill>
+                <a:latin typeface="+mn-lt"/>
+                <a:ea typeface="+mn-ea"/>
+                <a:cs typeface="+mn-cs"/>
+              </a:defRPr>
+            </a:lvl7pPr>
+            <a:lvl8pPr marL="3429000" indent="-228600" algn="l" defTabSz="914400" rtl="0" eaLnBrk="1" latinLnBrk="0" hangingPunct="1">
+              <a:lnSpc>
+                <a:spcPct val="90000"/>
+              </a:lnSpc>
+              <a:spcBef>
+                <a:spcPts val="500"/>
+              </a:spcBef>
+              <a:buFont typeface="Arial" panose="020B0604020202020204" pitchFamily="34" charset="0"/>
+              <a:buChar char="•"/>
+              <a:defRPr sz="1800" kern="1200">
+                <a:solidFill>
+                  <a:schemeClr val="tx1"/>
+                </a:solidFill>
+                <a:latin typeface="+mn-lt"/>
+                <a:ea typeface="+mn-ea"/>
+                <a:cs typeface="+mn-cs"/>
+              </a:defRPr>
+            </a:lvl8pPr>
+            <a:lvl9pPr marL="3886200" indent="-228600" algn="l" defTabSz="914400" rtl="0" eaLnBrk="1" latinLnBrk="0" hangingPunct="1">
+              <a:lnSpc>
+                <a:spcPct val="90000"/>
+              </a:lnSpc>
+              <a:spcBef>
+                <a:spcPts val="500"/>
+              </a:spcBef>
+              <a:buFont typeface="Arial" panose="020B0604020202020204" pitchFamily="34" charset="0"/>
+              <a:buChar char="•"/>
+              <a:defRPr sz="1800" kern="1200">
+                <a:solidFill>
+                  <a:schemeClr val="tx1"/>
+                </a:solidFill>
+                <a:latin typeface="+mn-lt"/>
+                <a:ea typeface="+mn-ea"/>
+                <a:cs typeface="+mn-cs"/>
+              </a:defRPr>
+            </a:lvl9pPr>
+          </a:lstStyle>
+          <a:p>
+            <a:endParaRPr lang="en-US" altLang="zh-CN" dirty="0">
+              <a:latin typeface="+mn-ea"/>
+            </a:endParaRPr>
+          </a:p>
+        </p:txBody>
+      </p:sp>
+      <p:sp>
+        <p:nvSpPr>
+          <p:cNvPr id="15" name="Content Placeholder 2"/>
+          <p:cNvSpPr txBox="1"/>
+          <p:nvPr/>
+        </p:nvSpPr>
+        <p:spPr>
+          <a:xfrm>
+            <a:off x="1113790" y="1758950"/>
+            <a:ext cx="10515600" cy="3631565"/>
+          </a:xfrm>
+          <a:prstGeom prst="rect">
+            <a:avLst/>
+          </a:prstGeom>
+        </p:spPr>
+        <p:txBody>
+          <a:bodyPr>
+            <a:normAutofit/>
+          </a:bodyPr>
+          <a:lstStyle>
+            <a:lvl1pPr marL="228600" indent="-228600" algn="l" defTabSz="914400" rtl="0" eaLnBrk="1" latinLnBrk="0" hangingPunct="1">
+              <a:lnSpc>
+                <a:spcPct val="90000"/>
+              </a:lnSpc>
+              <a:spcBef>
+                <a:spcPts val="1000"/>
+              </a:spcBef>
+              <a:buFont typeface="Arial" panose="020B0604020202020204" pitchFamily="34" charset="0"/>
+              <a:buChar char="•"/>
+              <a:defRPr sz="2800" kern="1200">
+                <a:solidFill>
+                  <a:schemeClr val="tx1"/>
+                </a:solidFill>
+                <a:latin typeface="+mn-lt"/>
+                <a:ea typeface="+mn-ea"/>
+                <a:cs typeface="+mn-cs"/>
+              </a:defRPr>
+            </a:lvl1pPr>
+            <a:lvl2pPr marL="685800" indent="-228600" algn="l" defTabSz="914400" rtl="0" eaLnBrk="1" latinLnBrk="0" hangingPunct="1">
+              <a:lnSpc>
+                <a:spcPct val="90000"/>
+              </a:lnSpc>
+              <a:spcBef>
+                <a:spcPts val="500"/>
+              </a:spcBef>
+              <a:buFont typeface="Arial" panose="020B0604020202020204" pitchFamily="34" charset="0"/>
+              <a:buChar char="•"/>
+              <a:defRPr sz="2400" kern="1200">
+                <a:solidFill>
+                  <a:schemeClr val="tx1"/>
+                </a:solidFill>
+                <a:latin typeface="+mn-lt"/>
+                <a:ea typeface="+mn-ea"/>
+                <a:cs typeface="+mn-cs"/>
+              </a:defRPr>
+            </a:lvl2pPr>
+            <a:lvl3pPr marL="1143000" indent="-228600" algn="l" defTabSz="914400" rtl="0" eaLnBrk="1" latinLnBrk="0" hangingPunct="1">
+              <a:lnSpc>
+                <a:spcPct val="90000"/>
+              </a:lnSpc>
+              <a:spcBef>
+                <a:spcPts val="500"/>
+              </a:spcBef>
+              <a:buFont typeface="Arial" panose="020B0604020202020204" pitchFamily="34" charset="0"/>
+              <a:buChar char="•"/>
+              <a:defRPr sz="2000" kern="1200">
+                <a:solidFill>
+                  <a:schemeClr val="tx1"/>
+                </a:solidFill>
+                <a:latin typeface="+mn-lt"/>
+                <a:ea typeface="+mn-ea"/>
+                <a:cs typeface="+mn-cs"/>
+              </a:defRPr>
+            </a:lvl3pPr>
+            <a:lvl4pPr marL="1600200" indent="-228600" algn="l" defTabSz="914400" rtl="0" eaLnBrk="1" latinLnBrk="0" hangingPunct="1">
+              <a:lnSpc>
+                <a:spcPct val="90000"/>
+              </a:lnSpc>
+              <a:spcBef>
+                <a:spcPts val="500"/>
+              </a:spcBef>
+              <a:buFont typeface="Arial" panose="020B0604020202020204" pitchFamily="34" charset="0"/>
+              <a:buChar char="•"/>
+              <a:defRPr sz="1800" kern="1200">
+                <a:solidFill>
+                  <a:schemeClr val="tx1"/>
+                </a:solidFill>
+                <a:latin typeface="+mn-lt"/>
+                <a:ea typeface="+mn-ea"/>
+                <a:cs typeface="+mn-cs"/>
+              </a:defRPr>
+            </a:lvl4pPr>
+            <a:lvl5pPr marL="2057400" indent="-228600" algn="l" defTabSz="914400" rtl="0" eaLnBrk="1" latinLnBrk="0" hangingPunct="1">
+              <a:lnSpc>
+                <a:spcPct val="90000"/>
+              </a:lnSpc>
+              <a:spcBef>
+                <a:spcPts val="500"/>
+              </a:spcBef>
+              <a:buFont typeface="Arial" panose="020B0604020202020204" pitchFamily="34" charset="0"/>
+              <a:buChar char="•"/>
+              <a:defRPr sz="1800" kern="1200">
+                <a:solidFill>
+                  <a:schemeClr val="tx1"/>
+                </a:solidFill>
+                <a:latin typeface="+mn-lt"/>
+                <a:ea typeface="+mn-ea"/>
+                <a:cs typeface="+mn-cs"/>
+              </a:defRPr>
+            </a:lvl5pPr>
+            <a:lvl6pPr marL="2514600" indent="-228600" algn="l" defTabSz="914400" rtl="0" eaLnBrk="1" latinLnBrk="0" hangingPunct="1">
+              <a:lnSpc>
+                <a:spcPct val="90000"/>
+              </a:lnSpc>
+              <a:spcBef>
+                <a:spcPts val="500"/>
+              </a:spcBef>
+              <a:buFont typeface="Arial" panose="020B0604020202020204" pitchFamily="34" charset="0"/>
+              <a:buChar char="•"/>
+              <a:defRPr sz="1800" kern="1200">
+                <a:solidFill>
+                  <a:schemeClr val="tx1"/>
+                </a:solidFill>
+                <a:latin typeface="+mn-lt"/>
+                <a:ea typeface="+mn-ea"/>
+                <a:cs typeface="+mn-cs"/>
+              </a:defRPr>
+            </a:lvl6pPr>
+            <a:lvl7pPr marL="2971800" indent="-228600" algn="l" defTabSz="914400" rtl="0" eaLnBrk="1" latinLnBrk="0" hangingPunct="1">
+              <a:lnSpc>
+                <a:spcPct val="90000"/>
+              </a:lnSpc>
+              <a:spcBef>
+                <a:spcPts val="500"/>
+              </a:spcBef>
+              <a:buFont typeface="Arial" panose="020B0604020202020204" pitchFamily="34" charset="0"/>
+              <a:buChar char="•"/>
+              <a:defRPr sz="1800" kern="1200">
+                <a:solidFill>
+                  <a:schemeClr val="tx1"/>
+                </a:solidFill>
+                <a:latin typeface="+mn-lt"/>
+                <a:ea typeface="+mn-ea"/>
+                <a:cs typeface="+mn-cs"/>
+              </a:defRPr>
+            </a:lvl7pPr>
+            <a:lvl8pPr marL="3429000" indent="-228600" algn="l" defTabSz="914400" rtl="0" eaLnBrk="1" latinLnBrk="0" hangingPunct="1">
+              <a:lnSpc>
+                <a:spcPct val="90000"/>
+              </a:lnSpc>
+              <a:spcBef>
+                <a:spcPts val="500"/>
+              </a:spcBef>
+              <a:buFont typeface="Arial" panose="020B0604020202020204" pitchFamily="34" charset="0"/>
+              <a:buChar char="•"/>
+              <a:defRPr sz="1800" kern="1200">
+                <a:solidFill>
+                  <a:schemeClr val="tx1"/>
+                </a:solidFill>
+                <a:latin typeface="+mn-lt"/>
+                <a:ea typeface="+mn-ea"/>
+                <a:cs typeface="+mn-cs"/>
+              </a:defRPr>
+            </a:lvl8pPr>
+            <a:lvl9pPr marL="3886200" indent="-228600" algn="l" defTabSz="914400" rtl="0" eaLnBrk="1" latinLnBrk="0" hangingPunct="1">
+              <a:lnSpc>
+                <a:spcPct val="90000"/>
+              </a:lnSpc>
+              <a:spcBef>
+                <a:spcPts val="500"/>
+              </a:spcBef>
+              <a:buFont typeface="Arial" panose="020B0604020202020204" pitchFamily="34" charset="0"/>
+              <a:buChar char="•"/>
+              <a:defRPr sz="1800" kern="1200">
+                <a:solidFill>
+                  <a:schemeClr val="tx1"/>
+                </a:solidFill>
+                <a:latin typeface="+mn-lt"/>
+                <a:ea typeface="+mn-ea"/>
+                <a:cs typeface="+mn-cs"/>
+              </a:defRPr>
+            </a:lvl9pPr>
+          </a:lstStyle>
+          <a:p>
+            <a:pPr marL="0" indent="0">
+              <a:buNone/>
+            </a:pPr>
+            <a:r>
+              <a:rPr lang="en-US" altLang="zh-CN" dirty="0" err="1">
+                <a:latin typeface="+mn-ea"/>
+              </a:rPr>
+              <a:t>Xcd</a:t>
+            </a:r>
+            <a:r>
+              <a:rPr lang="zh-CN" altLang="en-US" dirty="0">
+                <a:latin typeface="+mn-ea"/>
+              </a:rPr>
+              <a:t>：从硬件</a:t>
+            </a:r>
+            <a:r>
+              <a:rPr lang="en-US" altLang="zh-CN" dirty="0">
+                <a:latin typeface="+mn-ea"/>
+              </a:rPr>
+              <a:t>-</a:t>
+            </a:r>
+            <a:r>
+              <a:rPr lang="zh-CN" altLang="en-US" dirty="0">
+                <a:latin typeface="+mn-ea"/>
+              </a:rPr>
+              <a:t>操作系统</a:t>
+            </a:r>
+            <a:r>
+              <a:rPr lang="en-US" altLang="zh-CN" dirty="0">
+                <a:latin typeface="+mn-ea"/>
+              </a:rPr>
+              <a:t>-</a:t>
+            </a:r>
+            <a:r>
+              <a:rPr lang="zh-CN" altLang="en-US" dirty="0">
+                <a:latin typeface="+mn-ea"/>
+              </a:rPr>
+              <a:t>用户程序的全流程调试体验，和学长、社区的讨论、对</a:t>
+            </a:r>
+            <a:r>
+              <a:rPr lang="en-US" altLang="zh-CN" dirty="0">
+                <a:latin typeface="+mn-ea"/>
+              </a:rPr>
+              <a:t>x</a:t>
+            </a:r>
+          </a:p>
+          <a:p>
+            <a:pPr marL="0" indent="0">
+              <a:buNone/>
+            </a:pPr>
+            <a:r>
+              <a:rPr lang="en-US" altLang="zh-CN" dirty="0">
+                <a:latin typeface="+mn-ea"/>
+              </a:rPr>
+              <a:t>Sx</a:t>
+            </a:r>
+            <a:r>
+              <a:rPr lang="zh-CN" altLang="en-US" dirty="0">
+                <a:latin typeface="+mn-ea"/>
+              </a:rPr>
+              <a:t>：很喜欢现代调试工具，打断点看变量很舒服</a:t>
+            </a:r>
+          </a:p>
+        </p:txBody>
+      </p:sp>
+    </p:spTree>
+  </p:cSld>
+  <p:clrMapOvr>
+    <a:masterClrMapping/>
+  </p:clrMapOvr>
+</p:sld>
+</file>
+
+<file path=ppt/slides/slide15.xml><?xml version="1.0" encoding="utf-8"?>
+<p:sld xmlns:a="http://schemas.openxmlformats.org/drawingml/2006/main" xmlns:r="http://schemas.openxmlformats.org/officeDocument/2006/relationships" xmlns:p="http://schemas.openxmlformats.org/presentationml/2006/main">
+  <p:cSld>
+    <p:spTree>
+      <p:nvGrpSpPr>
+        <p:cNvPr id="1" name=""/>
+        <p:cNvGrpSpPr/>
+        <p:nvPr/>
+      </p:nvGrpSpPr>
+      <p:grpSpPr>
+        <a:xfrm>
+          <a:off x="0" y="0"/>
+          <a:ext cx="0" cy="0"/>
+          <a:chOff x="0" y="0"/>
+          <a:chExt cx="0" cy="0"/>
+        </a:xfrm>
+      </p:grpSpPr>
+      <p:sp>
+        <p:nvSpPr>
+          <p:cNvPr id="10" name="内容占位符 2"/>
+          <p:cNvSpPr txBox="1"/>
+          <p:nvPr/>
+        </p:nvSpPr>
+        <p:spPr>
+          <a:xfrm>
+            <a:off x="880106" y="2024290"/>
+            <a:ext cx="10395795" cy="4152673"/>
+          </a:xfrm>
+          <a:prstGeom prst="rect">
+            <a:avLst/>
+          </a:prstGeom>
+        </p:spPr>
+        <p:txBody>
+          <a:bodyPr/>
+          <a:lstStyle>
+            <a:lvl1pPr marL="228600" indent="-228600" algn="l" defTabSz="914400" rtl="0" eaLnBrk="1" latinLnBrk="0" hangingPunct="1">
+              <a:lnSpc>
+                <a:spcPct val="90000"/>
+              </a:lnSpc>
+              <a:spcBef>
+                <a:spcPts val="1000"/>
+              </a:spcBef>
+              <a:buFont typeface="Arial" panose="020B0604020202020204" pitchFamily="34" charset="0"/>
+              <a:buChar char="•"/>
+              <a:defRPr sz="2800" kern="1200">
+                <a:solidFill>
+                  <a:schemeClr val="tx1"/>
+                </a:solidFill>
+                <a:latin typeface="+mn-lt"/>
+                <a:ea typeface="+mn-ea"/>
+                <a:cs typeface="+mn-cs"/>
+              </a:defRPr>
+            </a:lvl1pPr>
+            <a:lvl2pPr marL="685800" indent="-228600" algn="l" defTabSz="914400" rtl="0" eaLnBrk="1" latinLnBrk="0" hangingPunct="1">
+              <a:lnSpc>
+                <a:spcPct val="90000"/>
+              </a:lnSpc>
+              <a:spcBef>
+                <a:spcPts val="500"/>
+              </a:spcBef>
+              <a:buFont typeface="Arial" panose="020B0604020202020204" pitchFamily="34" charset="0"/>
+              <a:buChar char="•"/>
+              <a:defRPr sz="2400" kern="1200">
+                <a:solidFill>
+                  <a:schemeClr val="tx1"/>
+                </a:solidFill>
+                <a:latin typeface="+mn-lt"/>
+                <a:ea typeface="+mn-ea"/>
+                <a:cs typeface="+mn-cs"/>
+              </a:defRPr>
+            </a:lvl2pPr>
+            <a:lvl3pPr marL="1143000" indent="-228600" algn="l" defTabSz="914400" rtl="0" eaLnBrk="1" latinLnBrk="0" hangingPunct="1">
+              <a:lnSpc>
+                <a:spcPct val="90000"/>
+              </a:lnSpc>
+              <a:spcBef>
+                <a:spcPts val="500"/>
+              </a:spcBef>
+              <a:buFont typeface="Arial" panose="020B0604020202020204" pitchFamily="34" charset="0"/>
+              <a:buChar char="•"/>
+              <a:defRPr sz="2000" kern="1200">
+                <a:solidFill>
+                  <a:schemeClr val="tx1"/>
+                </a:solidFill>
+                <a:latin typeface="+mn-lt"/>
+                <a:ea typeface="+mn-ea"/>
+                <a:cs typeface="+mn-cs"/>
+              </a:defRPr>
+            </a:lvl3pPr>
+            <a:lvl4pPr marL="1600200" indent="-228600" algn="l" defTabSz="914400" rtl="0" eaLnBrk="1" latinLnBrk="0" hangingPunct="1">
+              <a:lnSpc>
+                <a:spcPct val="90000"/>
+              </a:lnSpc>
+              <a:spcBef>
+                <a:spcPts val="500"/>
+              </a:spcBef>
+              <a:buFont typeface="Arial" panose="020B0604020202020204" pitchFamily="34" charset="0"/>
+              <a:buChar char="•"/>
+              <a:defRPr sz="1800" kern="1200">
+                <a:solidFill>
+                  <a:schemeClr val="tx1"/>
+                </a:solidFill>
+                <a:latin typeface="+mn-lt"/>
+                <a:ea typeface="+mn-ea"/>
+                <a:cs typeface="+mn-cs"/>
+              </a:defRPr>
+            </a:lvl4pPr>
+            <a:lvl5pPr marL="2057400" indent="-228600" algn="l" defTabSz="914400" rtl="0" eaLnBrk="1" latinLnBrk="0" hangingPunct="1">
+              <a:lnSpc>
+                <a:spcPct val="90000"/>
+              </a:lnSpc>
+              <a:spcBef>
+                <a:spcPts val="500"/>
+              </a:spcBef>
+              <a:buFont typeface="Arial" panose="020B0604020202020204" pitchFamily="34" charset="0"/>
+              <a:buChar char="•"/>
+              <a:defRPr sz="1800" kern="1200">
+                <a:solidFill>
+                  <a:schemeClr val="tx1"/>
+                </a:solidFill>
+                <a:latin typeface="+mn-lt"/>
+                <a:ea typeface="+mn-ea"/>
+                <a:cs typeface="+mn-cs"/>
+              </a:defRPr>
+            </a:lvl5pPr>
+            <a:lvl6pPr marL="2514600" indent="-228600" algn="l" defTabSz="914400" rtl="0" eaLnBrk="1" latinLnBrk="0" hangingPunct="1">
+              <a:lnSpc>
+                <a:spcPct val="90000"/>
+              </a:lnSpc>
+              <a:spcBef>
+                <a:spcPts val="500"/>
+              </a:spcBef>
+              <a:buFont typeface="Arial" panose="020B0604020202020204" pitchFamily="34" charset="0"/>
+              <a:buChar char="•"/>
+              <a:defRPr sz="1800" kern="1200">
+                <a:solidFill>
+                  <a:schemeClr val="tx1"/>
+                </a:solidFill>
+                <a:latin typeface="+mn-lt"/>
+                <a:ea typeface="+mn-ea"/>
+                <a:cs typeface="+mn-cs"/>
+              </a:defRPr>
+            </a:lvl6pPr>
+            <a:lvl7pPr marL="2971800" indent="-228600" algn="l" defTabSz="914400" rtl="0" eaLnBrk="1" latinLnBrk="0" hangingPunct="1">
+              <a:lnSpc>
+                <a:spcPct val="90000"/>
+              </a:lnSpc>
+              <a:spcBef>
+                <a:spcPts val="500"/>
+              </a:spcBef>
+              <a:buFont typeface="Arial" panose="020B0604020202020204" pitchFamily="34" charset="0"/>
+              <a:buChar char="•"/>
+              <a:defRPr sz="1800" kern="1200">
+                <a:solidFill>
+                  <a:schemeClr val="tx1"/>
+                </a:solidFill>
+                <a:latin typeface="+mn-lt"/>
+                <a:ea typeface="+mn-ea"/>
+                <a:cs typeface="+mn-cs"/>
+              </a:defRPr>
+            </a:lvl7pPr>
+            <a:lvl8pPr marL="3429000" indent="-228600" algn="l" defTabSz="914400" rtl="0" eaLnBrk="1" latinLnBrk="0" hangingPunct="1">
+              <a:lnSpc>
+                <a:spcPct val="90000"/>
+              </a:lnSpc>
+              <a:spcBef>
+                <a:spcPts val="500"/>
+              </a:spcBef>
+              <a:buFont typeface="Arial" panose="020B0604020202020204" pitchFamily="34" charset="0"/>
+              <a:buChar char="•"/>
+              <a:defRPr sz="1800" kern="1200">
+                <a:solidFill>
+                  <a:schemeClr val="tx1"/>
+                </a:solidFill>
+                <a:latin typeface="+mn-lt"/>
+                <a:ea typeface="+mn-ea"/>
+                <a:cs typeface="+mn-cs"/>
+              </a:defRPr>
+            </a:lvl8pPr>
+            <a:lvl9pPr marL="3886200" indent="-228600" algn="l" defTabSz="914400" rtl="0" eaLnBrk="1" latinLnBrk="0" hangingPunct="1">
+              <a:lnSpc>
+                <a:spcPct val="90000"/>
+              </a:lnSpc>
+              <a:spcBef>
+                <a:spcPts val="500"/>
+              </a:spcBef>
+              <a:buFont typeface="Arial" panose="020B0604020202020204" pitchFamily="34" charset="0"/>
+              <a:buChar char="•"/>
+              <a:defRPr sz="1800" kern="1200">
+                <a:solidFill>
+                  <a:schemeClr val="tx1"/>
+                </a:solidFill>
+                <a:latin typeface="+mn-lt"/>
+                <a:ea typeface="+mn-ea"/>
+                <a:cs typeface="+mn-cs"/>
+              </a:defRPr>
+            </a:lvl9pPr>
+          </a:lstStyle>
+          <a:p>
+            <a:pPr marL="0" indent="0">
+              <a:buNone/>
+            </a:pPr>
+            <a:endParaRPr kumimoji="1" lang="zh-CN" altLang="en-US" dirty="0">
+              <a:solidFill>
+                <a:srgbClr val="FF0000"/>
+              </a:solidFill>
+            </a:endParaRPr>
+          </a:p>
+          <a:p>
+            <a:pPr marL="0" indent="0">
+              <a:buNone/>
+            </a:pPr>
+            <a:endParaRPr kumimoji="1" lang="zh-CN" altLang="en-US" dirty="0">
+              <a:solidFill>
+                <a:srgbClr val="FF0000"/>
+              </a:solidFill>
+            </a:endParaRPr>
+          </a:p>
+          <a:p>
+            <a:pPr marL="0" indent="0" algn="ctr">
+              <a:buNone/>
+            </a:pPr>
+            <a:r>
+              <a:rPr kumimoji="1" lang="zh-CN" altLang="en-US" sz="3600" dirty="0">
+                <a:solidFill>
+                  <a:srgbClr val="704F95"/>
+                </a:solidFill>
+                <a:latin typeface="思源宋体 Heavy" panose="02020900000000000000" pitchFamily="18" charset="-122"/>
+                <a:ea typeface="思源宋体 Heavy" panose="02020900000000000000" pitchFamily="18" charset="-122"/>
+              </a:rPr>
+              <a:t>感谢陈渝老师和向勇老师的指导！</a:t>
+            </a:r>
+            <a:endParaRPr kumimoji="1" lang="en-US" altLang="zh-CN" sz="3600" dirty="0">
+              <a:solidFill>
+                <a:srgbClr val="704F95"/>
+              </a:solidFill>
+              <a:latin typeface="思源宋体 Heavy" panose="02020900000000000000" pitchFamily="18" charset="-122"/>
+              <a:ea typeface="思源宋体 Heavy" panose="02020900000000000000" pitchFamily="18" charset="-122"/>
+            </a:endParaRPr>
+          </a:p>
+          <a:p>
+            <a:pPr marL="0" indent="0" algn="ctr">
+              <a:buNone/>
+            </a:pPr>
+            <a:r>
+              <a:rPr kumimoji="1" lang="zh-CN" altLang="en-US" sz="3600" dirty="0">
+                <a:solidFill>
+                  <a:srgbClr val="704F95"/>
+                </a:solidFill>
+                <a:latin typeface="思源宋体 Heavy" panose="02020900000000000000" pitchFamily="18" charset="-122"/>
+                <a:ea typeface="思源宋体 Heavy" panose="02020900000000000000" pitchFamily="18" charset="-122"/>
+              </a:rPr>
+              <a:t>感谢贾越凯、贺鲲鹏、尤予阳以及其他学长的帮助！</a:t>
+            </a:r>
+            <a:endParaRPr kumimoji="1" lang="en-US" altLang="zh-CN" sz="3600" dirty="0">
+              <a:solidFill>
+                <a:srgbClr val="704F95"/>
+              </a:solidFill>
+              <a:latin typeface="思源宋体 Heavy" panose="02020900000000000000" pitchFamily="18" charset="-122"/>
+              <a:ea typeface="思源宋体 Heavy" panose="02020900000000000000" pitchFamily="18" charset="-122"/>
+            </a:endParaRPr>
+          </a:p>
+          <a:p>
+            <a:pPr marL="0" indent="0" algn="ctr">
+              <a:buNone/>
+            </a:pPr>
+            <a:endParaRPr kumimoji="1" lang="en-US" altLang="zh-CN" sz="3600" dirty="0">
+              <a:solidFill>
+                <a:srgbClr val="704F95"/>
+              </a:solidFill>
+              <a:latin typeface="思源宋体 Heavy" panose="02020900000000000000" pitchFamily="18" charset="-122"/>
+              <a:ea typeface="思源宋体 Heavy" panose="02020900000000000000" pitchFamily="18" charset="-122"/>
+            </a:endParaRPr>
+          </a:p>
+        </p:txBody>
+      </p:sp>
+      <p:pic>
+        <p:nvPicPr>
+          <p:cNvPr id="8" name="Picture 8"/>
+          <p:cNvPicPr/>
+          <p:nvPr/>
+        </p:nvPicPr>
+        <p:blipFill>
+          <a:blip r:embed="rId3">
+            <a:clrChange>
+              <a:clrFrom>
+                <a:srgbClr val="FFFFFF"/>
+              </a:clrFrom>
+              <a:clrTo>
+                <a:srgbClr val="FFFFFF">
+                  <a:alpha val="0"/>
+                </a:srgbClr>
+              </a:clrTo>
+            </a:clrChange>
+          </a:blip>
+          <a:stretch>
+            <a:fillRect/>
+          </a:stretch>
+        </p:blipFill>
+        <p:spPr>
+          <a:xfrm>
+            <a:off x="7880269" y="6297384"/>
+            <a:ext cx="4120587" cy="514122"/>
+          </a:xfrm>
+          <a:prstGeom prst="rect">
+            <a:avLst/>
+          </a:prstGeom>
+        </p:spPr>
+      </p:pic>
+      <p:sp>
+        <p:nvSpPr>
           <p:cNvPr id="5" name="Rectangle 236"/>
           <p:cNvSpPr/>
           <p:nvPr/>
@@ -8501,7 +9294,7 @@
           <p:nvPr/>
         </p:nvPicPr>
         <p:blipFill>
-          <a:blip r:embed="rId2" cstate="print">
+          <a:blip r:embed="rId4" cstate="print">
             <a:extLst>
               <a:ext uri="{28A0092B-C50C-407E-A947-70E740481C1C}">
                 <a14:useLocalDpi xmlns:a14="http://schemas.microsoft.com/office/drawing/2010/main" val="0"/>
@@ -8618,13 +9411,6 @@
               </a:rPr>
               <a:t>目录</a:t>
             </a:r>
-            <a:endParaRPr lang="zh-CN" altLang="en-US" sz="4000" b="1" dirty="0">
-              <a:solidFill>
-                <a:srgbClr val="704F95"/>
-              </a:solidFill>
-              <a:latin typeface="思源宋体 Medium" panose="02020500000000000000" pitchFamily="18" charset="-122"/>
-              <a:ea typeface="思源宋体 Medium" panose="02020500000000000000" pitchFamily="18" charset="-122"/>
-            </a:endParaRPr>
           </a:p>
         </p:txBody>
       </p:sp>
@@ -8683,7 +9469,7 @@
           <p:nvPr/>
         </p:nvPicPr>
         <p:blipFill>
-          <a:blip r:embed="rId1">
+          <a:blip r:embed="rId3">
             <a:clrChange>
               <a:clrFrom>
                 <a:srgbClr val="FFFFFF"/>
@@ -8938,7 +9724,6 @@
               <a:rPr lang="zh-CN" altLang="en-US" sz="3200" dirty="0"/>
               <a:t>未来的规划</a:t>
             </a:r>
-            <a:endParaRPr lang="zh-CN" altLang="en-US" sz="3200" dirty="0"/>
           </a:p>
         </p:txBody>
       </p:sp>
@@ -9089,7 +9874,7 @@
           <p:nvPr/>
         </p:nvPicPr>
         <p:blipFill>
-          <a:blip r:embed="rId1">
+          <a:blip r:embed="rId3">
             <a:clrChange>
               <a:clrFrom>
                 <a:srgbClr val="FFFFFF"/>
@@ -9592,9 +10377,6 @@
               </a:rPr>
               <a:t>的实现</a:t>
             </a:r>
-            <a:endParaRPr lang="zh-CN" altLang="en-US" dirty="0">
-              <a:latin typeface="+mn-ea"/>
-            </a:endParaRPr>
           </a:p>
           <a:p>
             <a:endParaRPr lang="en-US" altLang="zh-CN" dirty="0">
@@ -9789,7 +10571,7 @@
           <p:nvPr/>
         </p:nvPicPr>
         <p:blipFill>
-          <a:blip r:embed="rId1">
+          <a:blip r:embed="rId3">
             <a:clrChange>
               <a:clrFrom>
                 <a:srgbClr val="FFFFFF"/>
@@ -10234,7 +11016,7 @@
           <p:nvPr/>
         </p:nvPicPr>
         <p:blipFill rotWithShape="1">
-          <a:blip r:embed="rId2"/>
+          <a:blip r:embed="rId4"/>
           <a:srcRect r="21884"/>
           <a:stretch>
             <a:fillRect/>
@@ -10259,7 +11041,7 @@
           <p:nvPr/>
         </p:nvPicPr>
         <p:blipFill rotWithShape="1">
-          <a:blip r:embed="rId3"/>
+          <a:blip r:embed="rId5"/>
           <a:srcRect r="35213"/>
           <a:stretch>
             <a:fillRect/>
@@ -10442,7 +11224,7 @@
           <p:nvPr/>
         </p:nvPicPr>
         <p:blipFill>
-          <a:blip r:embed="rId1">
+          <a:blip r:embed="rId3">
             <a:clrChange>
               <a:clrFrom>
                 <a:srgbClr val="FFFFFF"/>
@@ -10887,7 +11669,7 @@
           <p:nvPr/>
         </p:nvPicPr>
         <p:blipFill>
-          <a:blip r:embed="rId2"/>
+          <a:blip r:embed="rId4"/>
           <a:stretch>
             <a:fillRect/>
           </a:stretch>
@@ -10911,7 +11693,7 @@
           <p:nvPr/>
         </p:nvPicPr>
         <p:blipFill>
-          <a:blip r:embed="rId3"/>
+          <a:blip r:embed="rId5"/>
           <a:stretch>
             <a:fillRect/>
           </a:stretch>
@@ -11093,7 +11875,7 @@
           <p:nvPr/>
         </p:nvPicPr>
         <p:blipFill>
-          <a:blip r:embed="rId1">
+          <a:blip r:embed="rId3">
             <a:clrChange>
               <a:clrFrom>
                 <a:srgbClr val="FFFFFF"/>
@@ -11538,7 +12320,7 @@
           <p:nvPr/>
         </p:nvPicPr>
         <p:blipFill>
-          <a:blip r:embed="rId2"/>
+          <a:blip r:embed="rId4"/>
           <a:stretch>
             <a:fillRect/>
           </a:stretch>
@@ -11562,7 +12344,7 @@
           <p:nvPr/>
         </p:nvPicPr>
         <p:blipFill>
-          <a:blip r:embed="rId3"/>
+          <a:blip r:embed="rId5"/>
           <a:stretch>
             <a:fillRect/>
           </a:stretch>
@@ -11744,7 +12526,7 @@
           <p:nvPr/>
         </p:nvPicPr>
         <p:blipFill>
-          <a:blip r:embed="rId1">
+          <a:blip r:embed="rId3">
             <a:clrChange>
               <a:clrFrom>
                 <a:srgbClr val="FFFFFF"/>
@@ -12165,7 +12947,7 @@
           <p:nvPr/>
         </p:nvPicPr>
         <p:blipFill>
-          <a:blip r:embed="rId2"/>
+          <a:blip r:embed="rId4"/>
           <a:stretch>
             <a:fillRect/>
           </a:stretch>
@@ -12189,7 +12971,7 @@
           <p:nvPr/>
         </p:nvPicPr>
         <p:blipFill>
-          <a:blip r:embed="rId3"/>
+          <a:blip r:embed="rId5"/>
           <a:stretch>
             <a:fillRect/>
           </a:stretch>
@@ -12213,7 +12995,7 @@
           <p:nvPr/>
         </p:nvPicPr>
         <p:blipFill>
-          <a:blip r:embed="rId4"/>
+          <a:blip r:embed="rId6"/>
           <a:stretch>
             <a:fillRect/>
           </a:stretch>
@@ -12631,7 +13413,7 @@
                 <a:latin typeface="思源宋体 Medium" panose="02020500000000000000" pitchFamily="18" charset="-122"/>
                 <a:ea typeface="思源宋体 Medium" panose="02020500000000000000" pitchFamily="18" charset="-122"/>
               </a:rPr>
-              <a:t>横向对比</a:t>
+              <a:t>直接发送比例</a:t>
             </a:r>
             <a:endParaRPr lang="en-US" altLang="zh-CN" sz="4000" b="1" dirty="0">
               <a:solidFill>
@@ -12698,7 +13480,7 @@
           <p:nvPr/>
         </p:nvPicPr>
         <p:blipFill>
-          <a:blip r:embed="rId1">
+          <a:blip r:embed="rId3">
             <a:clrChange>
               <a:clrFrom>
                 <a:srgbClr val="FFFFFF"/>
@@ -12928,7 +13710,7 @@
         </p:nvSpPr>
         <p:spPr>
           <a:xfrm>
-            <a:off x="1056186" y="1833032"/>
+            <a:off x="1113971" y="1801282"/>
             <a:ext cx="10515600" cy="4351338"/>
           </a:xfrm>
           <a:prstGeom prst="rect">
@@ -13104,81 +13886,223 @@
             </a:lvl9pPr>
           </a:lstStyle>
           <a:p>
-            <a:r>
-              <a:rPr lang="zh-CN" altLang="en-US" dirty="0">
-                <a:latin typeface="+mn-ea"/>
-              </a:rPr>
-              <a:t>复现</a:t>
-            </a:r>
-            <a:r>
-              <a:rPr lang="en-US" altLang="zh-CN" dirty="0">
-                <a:latin typeface="+mn-ea"/>
-              </a:rPr>
-              <a:t> linux rfc </a:t>
-            </a:r>
-            <a:r>
-              <a:rPr lang="zh-CN" altLang="en-US" dirty="0">
-                <a:latin typeface="+mn-ea"/>
-              </a:rPr>
-              <a:t>性能测试结果</a:t>
-            </a:r>
-            <a:endParaRPr lang="zh-CN" altLang="en-US" dirty="0">
+            <a:endParaRPr lang="en-US" altLang="zh-CN" dirty="0">
               <a:latin typeface="+mn-ea"/>
             </a:endParaRPr>
           </a:p>
         </p:txBody>
       </p:sp>
-      <p:pic>
-        <p:nvPicPr>
-          <p:cNvPr id="2" name="图片 1"/>
-          <p:cNvPicPr>
-            <a:picLocks noChangeAspect="1"/>
-          </p:cNvPicPr>
+      <p:sp>
+        <p:nvSpPr>
+          <p:cNvPr id="15" name="Content Placeholder 2"/>
+          <p:cNvSpPr txBox="1"/>
           <p:nvPr/>
-        </p:nvPicPr>
-        <p:blipFill>
-          <a:blip r:embed="rId2"/>
-          <a:stretch>
-            <a:fillRect/>
-          </a:stretch>
-        </p:blipFill>
+        </p:nvSpPr>
         <p:spPr>
           <a:xfrm>
-            <a:off x="663575" y="2680970"/>
-            <a:ext cx="5708015" cy="2889250"/>
+            <a:off x="1367265" y="5506890"/>
+            <a:ext cx="5961790" cy="1087314"/>
           </a:xfrm>
           <a:prstGeom prst="rect">
             <a:avLst/>
           </a:prstGeom>
         </p:spPr>
-      </p:pic>
+        <p:txBody>
+          <a:bodyPr>
+            <a:normAutofit/>
+          </a:bodyPr>
+          <a:lstStyle>
+            <a:lvl1pPr marL="228600" indent="-228600" algn="l" defTabSz="914400" rtl="0" eaLnBrk="1" latinLnBrk="0" hangingPunct="1">
+              <a:lnSpc>
+                <a:spcPct val="90000"/>
+              </a:lnSpc>
+              <a:spcBef>
+                <a:spcPts val="1000"/>
+              </a:spcBef>
+              <a:buFont typeface="Arial" panose="020B0604020202020204" pitchFamily="34" charset="0"/>
+              <a:buChar char="•"/>
+              <a:defRPr sz="2800" kern="1200">
+                <a:solidFill>
+                  <a:schemeClr val="tx1"/>
+                </a:solidFill>
+                <a:latin typeface="+mn-lt"/>
+                <a:ea typeface="+mn-ea"/>
+                <a:cs typeface="+mn-cs"/>
+              </a:defRPr>
+            </a:lvl1pPr>
+            <a:lvl2pPr marL="685800" indent="-228600" algn="l" defTabSz="914400" rtl="0" eaLnBrk="1" latinLnBrk="0" hangingPunct="1">
+              <a:lnSpc>
+                <a:spcPct val="90000"/>
+              </a:lnSpc>
+              <a:spcBef>
+                <a:spcPts val="500"/>
+              </a:spcBef>
+              <a:buFont typeface="Arial" panose="020B0604020202020204" pitchFamily="34" charset="0"/>
+              <a:buChar char="•"/>
+              <a:defRPr sz="2400" kern="1200">
+                <a:solidFill>
+                  <a:schemeClr val="tx1"/>
+                </a:solidFill>
+                <a:latin typeface="+mn-lt"/>
+                <a:ea typeface="+mn-ea"/>
+                <a:cs typeface="+mn-cs"/>
+              </a:defRPr>
+            </a:lvl2pPr>
+            <a:lvl3pPr marL="1143000" indent="-228600" algn="l" defTabSz="914400" rtl="0" eaLnBrk="1" latinLnBrk="0" hangingPunct="1">
+              <a:lnSpc>
+                <a:spcPct val="90000"/>
+              </a:lnSpc>
+              <a:spcBef>
+                <a:spcPts val="500"/>
+              </a:spcBef>
+              <a:buFont typeface="Arial" panose="020B0604020202020204" pitchFamily="34" charset="0"/>
+              <a:buChar char="•"/>
+              <a:defRPr sz="2000" kern="1200">
+                <a:solidFill>
+                  <a:schemeClr val="tx1"/>
+                </a:solidFill>
+                <a:latin typeface="+mn-lt"/>
+                <a:ea typeface="+mn-ea"/>
+                <a:cs typeface="+mn-cs"/>
+              </a:defRPr>
+            </a:lvl3pPr>
+            <a:lvl4pPr marL="1600200" indent="-228600" algn="l" defTabSz="914400" rtl="0" eaLnBrk="1" latinLnBrk="0" hangingPunct="1">
+              <a:lnSpc>
+                <a:spcPct val="90000"/>
+              </a:lnSpc>
+              <a:spcBef>
+                <a:spcPts val="500"/>
+              </a:spcBef>
+              <a:buFont typeface="Arial" panose="020B0604020202020204" pitchFamily="34" charset="0"/>
+              <a:buChar char="•"/>
+              <a:defRPr sz="1800" kern="1200">
+                <a:solidFill>
+                  <a:schemeClr val="tx1"/>
+                </a:solidFill>
+                <a:latin typeface="+mn-lt"/>
+                <a:ea typeface="+mn-ea"/>
+                <a:cs typeface="+mn-cs"/>
+              </a:defRPr>
+            </a:lvl4pPr>
+            <a:lvl5pPr marL="2057400" indent="-228600" algn="l" defTabSz="914400" rtl="0" eaLnBrk="1" latinLnBrk="0" hangingPunct="1">
+              <a:lnSpc>
+                <a:spcPct val="90000"/>
+              </a:lnSpc>
+              <a:spcBef>
+                <a:spcPts val="500"/>
+              </a:spcBef>
+              <a:buFont typeface="Arial" panose="020B0604020202020204" pitchFamily="34" charset="0"/>
+              <a:buChar char="•"/>
+              <a:defRPr sz="1800" kern="1200">
+                <a:solidFill>
+                  <a:schemeClr val="tx1"/>
+                </a:solidFill>
+                <a:latin typeface="+mn-lt"/>
+                <a:ea typeface="+mn-ea"/>
+                <a:cs typeface="+mn-cs"/>
+              </a:defRPr>
+            </a:lvl5pPr>
+            <a:lvl6pPr marL="2514600" indent="-228600" algn="l" defTabSz="914400" rtl="0" eaLnBrk="1" latinLnBrk="0" hangingPunct="1">
+              <a:lnSpc>
+                <a:spcPct val="90000"/>
+              </a:lnSpc>
+              <a:spcBef>
+                <a:spcPts val="500"/>
+              </a:spcBef>
+              <a:buFont typeface="Arial" panose="020B0604020202020204" pitchFamily="34" charset="0"/>
+              <a:buChar char="•"/>
+              <a:defRPr sz="1800" kern="1200">
+                <a:solidFill>
+                  <a:schemeClr val="tx1"/>
+                </a:solidFill>
+                <a:latin typeface="+mn-lt"/>
+                <a:ea typeface="+mn-ea"/>
+                <a:cs typeface="+mn-cs"/>
+              </a:defRPr>
+            </a:lvl6pPr>
+            <a:lvl7pPr marL="2971800" indent="-228600" algn="l" defTabSz="914400" rtl="0" eaLnBrk="1" latinLnBrk="0" hangingPunct="1">
+              <a:lnSpc>
+                <a:spcPct val="90000"/>
+              </a:lnSpc>
+              <a:spcBef>
+                <a:spcPts val="500"/>
+              </a:spcBef>
+              <a:buFont typeface="Arial" panose="020B0604020202020204" pitchFamily="34" charset="0"/>
+              <a:buChar char="•"/>
+              <a:defRPr sz="1800" kern="1200">
+                <a:solidFill>
+                  <a:schemeClr val="tx1"/>
+                </a:solidFill>
+                <a:latin typeface="+mn-lt"/>
+                <a:ea typeface="+mn-ea"/>
+                <a:cs typeface="+mn-cs"/>
+              </a:defRPr>
+            </a:lvl7pPr>
+            <a:lvl8pPr marL="3429000" indent="-228600" algn="l" defTabSz="914400" rtl="0" eaLnBrk="1" latinLnBrk="0" hangingPunct="1">
+              <a:lnSpc>
+                <a:spcPct val="90000"/>
+              </a:lnSpc>
+              <a:spcBef>
+                <a:spcPts val="500"/>
+              </a:spcBef>
+              <a:buFont typeface="Arial" panose="020B0604020202020204" pitchFamily="34" charset="0"/>
+              <a:buChar char="•"/>
+              <a:defRPr sz="1800" kern="1200">
+                <a:solidFill>
+                  <a:schemeClr val="tx1"/>
+                </a:solidFill>
+                <a:latin typeface="+mn-lt"/>
+                <a:ea typeface="+mn-ea"/>
+                <a:cs typeface="+mn-cs"/>
+              </a:defRPr>
+            </a:lvl8pPr>
+            <a:lvl9pPr marL="3886200" indent="-228600" algn="l" defTabSz="914400" rtl="0" eaLnBrk="1" latinLnBrk="0" hangingPunct="1">
+              <a:lnSpc>
+                <a:spcPct val="90000"/>
+              </a:lnSpc>
+              <a:spcBef>
+                <a:spcPts val="500"/>
+              </a:spcBef>
+              <a:buFont typeface="Arial" panose="020B0604020202020204" pitchFamily="34" charset="0"/>
+              <a:buChar char="•"/>
+              <a:defRPr sz="1800" kern="1200">
+                <a:solidFill>
+                  <a:schemeClr val="tx1"/>
+                </a:solidFill>
+                <a:latin typeface="+mn-lt"/>
+                <a:ea typeface="+mn-ea"/>
+                <a:cs typeface="+mn-cs"/>
+              </a:defRPr>
+            </a:lvl9pPr>
+          </a:lstStyle>
+          <a:p>
+            <a:r>
+              <a:rPr lang="en-US" altLang="zh-CN" dirty="0">
+                <a:latin typeface="+mn-ea"/>
+              </a:rPr>
+              <a:t>1000</a:t>
+            </a:r>
+            <a:r>
+              <a:rPr lang="zh-CN" altLang="en-US" dirty="0">
+                <a:latin typeface="+mn-ea"/>
+              </a:rPr>
+              <a:t>次来回收发中，只有个位数次由操作系统调度发送</a:t>
+            </a:r>
+            <a:endParaRPr lang="en-US" altLang="zh-CN" dirty="0">
+              <a:latin typeface="+mn-ea"/>
+            </a:endParaRPr>
+          </a:p>
+        </p:txBody>
+      </p:sp>
       <p:pic>
         <p:nvPicPr>
-          <p:cNvPr id="7" name="图片 6"/>
-          <p:cNvPicPr>
-            <a:picLocks noChangeAspect="1"/>
-          </p:cNvPicPr>
-          <p:nvPr/>
-        </p:nvPicPr>
-        <p:blipFill>
-          <a:blip r:embed="rId3"/>
-          <a:stretch>
-            <a:fillRect/>
-          </a:stretch>
-        </p:blipFill>
-        <p:spPr>
-          <a:xfrm>
-            <a:off x="7133590" y="2255520"/>
-            <a:ext cx="4031615" cy="2124710"/>
-          </a:xfrm>
-          <a:prstGeom prst="rect">
-            <a:avLst/>
-          </a:prstGeom>
-        </p:spPr>
-      </p:pic>
-      <p:pic>
-        <p:nvPicPr>
-          <p:cNvPr id="9" name="图片 8"/>
+          <p:cNvPr id="7" name="Picture 6">
+            <a:extLst>
+              <a:ext uri="{FF2B5EF4-FFF2-40B4-BE49-F238E27FC236}">
+                <a16:creationId xmlns:a16="http://schemas.microsoft.com/office/drawing/2014/main" id="{E0DA15DC-0266-F548-BBE1-A3EC7F358341}"/>
+              </a:ext>
+            </a:extLst>
+          </p:cNvPr>
           <p:cNvPicPr>
             <a:picLocks noChangeAspect="1"/>
           </p:cNvPicPr>
@@ -13192,8 +14116,8 @@
         </p:blipFill>
         <p:spPr>
           <a:xfrm>
-            <a:off x="7141845" y="4573270"/>
-            <a:ext cx="4023360" cy="2059940"/>
+            <a:off x="1309769" y="1442282"/>
+            <a:ext cx="8001000" cy="3759200"/>
           </a:xfrm>
           <a:prstGeom prst="rect">
             <a:avLst/>
@@ -13202,46 +14126,48 @@
       </p:pic>
       <p:sp>
         <p:nvSpPr>
-          <p:cNvPr id="10" name="文本框 9"/>
+          <p:cNvPr id="16" name="文本框 15">
+            <a:extLst>
+              <a:ext uri="{FF2B5EF4-FFF2-40B4-BE49-F238E27FC236}">
+                <a16:creationId xmlns:a16="http://schemas.microsoft.com/office/drawing/2014/main" id="{C64886C1-A879-6344-B80A-15F33EEDFC91}"/>
+              </a:ext>
+            </a:extLst>
+          </p:cNvPr>
           <p:cNvSpPr txBox="1"/>
           <p:nvPr/>
         </p:nvSpPr>
         <p:spPr>
           <a:xfrm>
-            <a:off x="7250430" y="1706245"/>
-            <a:ext cx="3608705" cy="368300"/>
+            <a:off x="3049286" y="1753364"/>
+            <a:ext cx="1979914" cy="612248"/>
           </a:xfrm>
           <a:prstGeom prst="rect">
             <a:avLst/>
           </a:prstGeom>
           <a:noFill/>
+          <a:ln w="60325" cmpd="sng">
+            <a:solidFill>
+              <a:srgbClr val="FF0000"/>
+            </a:solidFill>
+            <a:prstDash val="solid"/>
+          </a:ln>
         </p:spPr>
         <p:txBody>
           <a:bodyPr wrap="square" rtlCol="0">
             <a:spAutoFit/>
           </a:bodyPr>
-          <a:p>
-            <a:r>
-              <a:rPr lang="zh-CN" altLang="en-US"/>
-              <a:t>上：</a:t>
-            </a:r>
-            <a:r>
-              <a:rPr lang="en-US" altLang="zh-CN"/>
-              <a:t>uintr</a:t>
-            </a:r>
-            <a:r>
-              <a:rPr lang="zh-CN" altLang="en-US"/>
-              <a:t>；下：</a:t>
-            </a:r>
-            <a:r>
-              <a:rPr lang="en-US" altLang="zh-CN"/>
-              <a:t>signal</a:t>
-            </a:r>
-            <a:endParaRPr lang="en-US" altLang="zh-CN"/>
+          <a:lstStyle/>
+          <a:p>
+            <a:endParaRPr kumimoji="1" lang="zh-CN" altLang="en-US" dirty="0"/>
           </a:p>
         </p:txBody>
       </p:sp>
     </p:spTree>
+    <p:extLst>
+      <p:ext uri="{BB962C8B-B14F-4D97-AF65-F5344CB8AC3E}">
+        <p14:creationId xmlns:p14="http://schemas.microsoft.com/office/powerpoint/2010/main" val="1416881035"/>
+      </p:ext>
+    </p:extLst>
   </p:cSld>
   <p:clrMapOvr>
     <a:masterClrMapping/>
@@ -13408,7 +14334,7 @@
           <p:nvPr/>
         </p:nvPicPr>
         <p:blipFill>
-          <a:blip r:embed="rId1">
+          <a:blip r:embed="rId3">
             <a:clrChange>
               <a:clrFrom>
                 <a:srgbClr val="FFFFFF"/>
@@ -13832,9 +14758,6 @@
               </a:rPr>
               <a:t>性能测试结果</a:t>
             </a:r>
-            <a:endParaRPr lang="zh-CN" altLang="en-US" dirty="0">
-              <a:latin typeface="+mn-ea"/>
-            </a:endParaRPr>
           </a:p>
         </p:txBody>
       </p:sp>
@@ -13847,7 +14770,7 @@
           <p:nvPr/>
         </p:nvPicPr>
         <p:blipFill>
-          <a:blip r:embed="rId2"/>
+          <a:blip r:embed="rId4"/>
           <a:stretch>
             <a:fillRect/>
           </a:stretch>
@@ -13871,7 +14794,7 @@
           <p:nvPr/>
         </p:nvPicPr>
         <p:blipFill>
-          <a:blip r:embed="rId3"/>
+          <a:blip r:embed="rId5"/>
           <a:stretch>
             <a:fillRect/>
           </a:stretch>
@@ -13886,6 +14809,30 @@
           </a:prstGeom>
         </p:spPr>
       </p:pic>
+      <p:pic>
+        <p:nvPicPr>
+          <p:cNvPr id="9" name="图片 8"/>
+          <p:cNvPicPr>
+            <a:picLocks noChangeAspect="1"/>
+          </p:cNvPicPr>
+          <p:nvPr/>
+        </p:nvPicPr>
+        <p:blipFill>
+          <a:blip r:embed="rId6"/>
+          <a:stretch>
+            <a:fillRect/>
+          </a:stretch>
+        </p:blipFill>
+        <p:spPr>
+          <a:xfrm>
+            <a:off x="7141845" y="4573270"/>
+            <a:ext cx="4023360" cy="2059940"/>
+          </a:xfrm>
+          <a:prstGeom prst="rect">
+            <a:avLst/>
+          </a:prstGeom>
+        </p:spPr>
+      </p:pic>
       <p:sp>
         <p:nvSpPr>
           <p:cNvPr id="10" name="文本框 9"/>
@@ -13906,6 +14853,7 @@
           <a:bodyPr wrap="square" rtlCol="0">
             <a:spAutoFit/>
           </a:bodyPr>
+          <a:lstStyle/>
           <a:p>
             <a:r>
               <a:rPr lang="zh-CN" altLang="en-US"/>
@@ -13921,37 +14869,11 @@
             </a:r>
             <a:r>
               <a:rPr lang="en-US" altLang="zh-CN"/>
-              <a:t>eventfd</a:t>
-            </a:r>
-            <a:endParaRPr lang="en-US" altLang="zh-CN"/>
-          </a:p>
-        </p:txBody>
-      </p:sp>
-      <p:pic>
-        <p:nvPicPr>
-          <p:cNvPr id="3" name="图片 2"/>
-          <p:cNvPicPr>
-            <a:picLocks noChangeAspect="1"/>
-          </p:cNvPicPr>
-          <p:nvPr/>
-        </p:nvPicPr>
-        <p:blipFill>
-          <a:blip r:embed="rId4"/>
-          <a:srcRect l="819"/>
-          <a:stretch>
-            <a:fillRect/>
-          </a:stretch>
-        </p:blipFill>
-        <p:spPr>
-          <a:xfrm>
-            <a:off x="7150100" y="4454525"/>
-            <a:ext cx="3998595" cy="2186305"/>
-          </a:xfrm>
-          <a:prstGeom prst="rect">
-            <a:avLst/>
-          </a:prstGeom>
-        </p:spPr>
-      </p:pic>
+              <a:t>signal</a:t>
+            </a:r>
+          </a:p>
+        </p:txBody>
+      </p:sp>
     </p:spTree>
   </p:cSld>
   <p:clrMapOvr>
@@ -14211,6 +15133,8 @@
       </a:bgFillStyleLst>
     </a:fmtScheme>
   </a:themeElements>
+  <a:objectDefaults/>
+  <a:extraClrSchemeLst/>
   <a:extLst>
     <a:ext uri="{05A4C25C-085E-4340-85A3-A5531E510DB2}">
       <thm15:themeFamily xmlns:thm15="http://schemas.microsoft.com/office/thememl/2012/main" name="Office Theme" id="{62F939B6-93AF-4DB8-9C6B-D6C7DFDC589F}" vid="{4A3C46E8-61CC-4603-A589-7422A47A8E4A}"/>
@@ -14470,6 +15394,8 @@
       </a:bgFillStyleLst>
     </a:fmtScheme>
   </a:themeElements>
+  <a:objectDefaults/>
+  <a:extraClrSchemeLst/>
   <a:extLst>
     <a:ext uri="{05A4C25C-085E-4340-85A3-A5531E510DB2}">
       <thm15:themeFamily xmlns:thm15="http://schemas.microsoft.com/office/thememl/2012/main" name="Office Theme" id="{62F939B6-93AF-4DB8-9C6B-D6C7DFDC589F}" vid="{4A3C46E8-61CC-4603-A589-7422A47A8E4A}"/>

</xml_diff>